<commit_message>
changes to ppt and create db
</commit_message>
<xml_diff>
--- a/flaskNumberGuesserGame Beining, Hennig.pptx
+++ b/flaskNumberGuesserGame Beining, Hennig.pptx
@@ -7,6 +7,9 @@
   <p:sldIdLst>
     <p:sldId id="256" r:id="rId2"/>
     <p:sldId id="257" r:id="rId3"/>
+    <p:sldId id="260" r:id="rId4"/>
+    <p:sldId id="258" r:id="rId5"/>
+    <p:sldId id="261" r:id="rId6"/>
   </p:sldIdLst>
   <p:sldSz cx="12192000" cy="6858000"/>
   <p:notesSz cx="6858000" cy="9144000"/>
@@ -105,6 +108,11 @@
       </a:defRPr>
     </a:lvl9pPr>
   </p:defaultTextStyle>
+  <p:extLst>
+    <p:ext uri="{EFAFB233-063F-42B5-8137-9DF3F51BA10A}">
+      <p15:sldGuideLst xmlns:p15="http://schemas.microsoft.com/office/powerpoint/2012/main"/>
+    </p:ext>
+  </p:extLst>
 </p:presentation>
 </file>
 
@@ -255,7 +263,7 @@
           <a:p>
             <a:fld id="{65B910DF-B555-4D30-B35E-2297D59E32D0}" type="datetime1">
               <a:rPr lang="en-US" smtClean="0"/>
-              <a:t>9/13/2023</a:t>
+              <a:t>9/14/2023</a:t>
             </a:fld>
             <a:endParaRPr lang="en-US" dirty="0"/>
           </a:p>
@@ -458,7 +466,7 @@
           <a:p>
             <a:fld id="{29D1D79F-E600-4AC1-A639-0B9FB8286C38}" type="datetime1">
               <a:rPr lang="en-US" smtClean="0"/>
-              <a:t>9/13/2023</a:t>
+              <a:t>9/14/2023</a:t>
             </a:fld>
             <a:endParaRPr lang="en-US" dirty="0"/>
           </a:p>
@@ -671,7 +679,7 @@
           <a:p>
             <a:fld id="{390F5D60-A842-4D08-9D7D-A7A57AB501A2}" type="datetime1">
               <a:rPr lang="en-US" smtClean="0"/>
-              <a:t>9/13/2023</a:t>
+              <a:t>9/14/2023</a:t>
             </a:fld>
             <a:endParaRPr lang="en-US" dirty="0"/>
           </a:p>
@@ -886,7 +894,7 @@
           <a:p>
             <a:fld id="{0DF2F1F9-9322-493A-A9EE-BB75692CE5F5}" type="datetime1">
               <a:rPr lang="en-US" smtClean="0"/>
-              <a:t>9/13/2023</a:t>
+              <a:t>9/14/2023</a:t>
             </a:fld>
             <a:endParaRPr lang="en-US" dirty="0"/>
           </a:p>
@@ -1166,7 +1174,7 @@
           <a:p>
             <a:fld id="{7858DE51-4D5E-4D23-8181-86A5B05D5351}" type="datetime1">
               <a:rPr lang="en-US" smtClean="0"/>
-              <a:t>9/13/2023</a:t>
+              <a:t>9/14/2023</a:t>
             </a:fld>
             <a:endParaRPr lang="en-US" dirty="0"/>
           </a:p>
@@ -1436,7 +1444,7 @@
           <a:p>
             <a:fld id="{9C399FCA-87F3-427A-B1A2-15346103C68A}" type="datetime1">
               <a:rPr lang="en-US" smtClean="0"/>
-              <a:t>9/13/2023</a:t>
+              <a:t>9/14/2023</a:t>
             </a:fld>
             <a:endParaRPr lang="en-US" dirty="0"/>
           </a:p>
@@ -1853,7 +1861,7 @@
           <a:p>
             <a:fld id="{693DF709-7E2D-49E6-A629-D8E3363D194F}" type="datetime1">
               <a:rPr lang="en-US" smtClean="0"/>
-              <a:t>9/13/2023</a:t>
+              <a:t>9/14/2023</a:t>
             </a:fld>
             <a:endParaRPr lang="en-US" dirty="0"/>
           </a:p>
@@ -1999,7 +2007,7 @@
           <a:p>
             <a:fld id="{85D0A921-9375-4BAA-A7C2-7975528669FA}" type="datetime1">
               <a:rPr lang="en-US" smtClean="0"/>
-              <a:t>9/13/2023</a:t>
+              <a:t>9/14/2023</a:t>
             </a:fld>
             <a:endParaRPr lang="en-US" dirty="0"/>
           </a:p>
@@ -2117,7 +2125,7 @@
           <a:p>
             <a:fld id="{A5D25425-F285-48AE-A409-A618E3EEA628}" type="datetime1">
               <a:rPr lang="en-US" smtClean="0"/>
-              <a:t>9/13/2023</a:t>
+              <a:t>9/14/2023</a:t>
             </a:fld>
             <a:endParaRPr lang="en-US" dirty="0"/>
           </a:p>
@@ -2433,7 +2441,7 @@
           <a:p>
             <a:fld id="{EB56A94D-7D6A-4378-93F6-A3A33186E34B}" type="datetime1">
               <a:rPr lang="en-US" smtClean="0"/>
-              <a:t>9/13/2023</a:t>
+              <a:t>9/14/2023</a:t>
             </a:fld>
             <a:endParaRPr lang="en-US" dirty="0"/>
           </a:p>
@@ -2729,7 +2737,7 @@
           <a:p>
             <a:fld id="{285FC0F9-687B-4417-9D77-CE2D7AD8C321}" type="datetime1">
               <a:rPr lang="en-US" smtClean="0"/>
-              <a:t>9/13/2023</a:t>
+              <a:t>9/14/2023</a:t>
             </a:fld>
             <a:endParaRPr lang="en-US" dirty="0"/>
           </a:p>
@@ -3766,7 +3774,7 @@
           <a:p>
             <a:fld id="{B32DFD30-2122-4F4A-97B4-D0A849E36C5F}" type="datetime1">
               <a:rPr lang="en-US" smtClean="0"/>
-              <a:t>9/13/2023</a:t>
+              <a:t>9/14/2023</a:t>
             </a:fld>
             <a:endParaRPr lang="en-US" dirty="0"/>
           </a:p>
@@ -4214,7 +4222,7 @@
       </p:grpSpPr>
       <p:sp useBgFill="1">
         <p:nvSpPr>
-          <p:cNvPr id="16" name="Rectangle 8">
+          <p:cNvPr id="37" name="Rectangle 36">
             <a:extLst>
               <a:ext uri="{FF2B5EF4-FFF2-40B4-BE49-F238E27FC236}">
                 <a16:creationId xmlns:a16="http://schemas.microsoft.com/office/drawing/2014/main" id="{4E1EF4E8-5513-4BF5-BC41-04645281C672}"/>
@@ -4278,7 +4286,7 @@
         </p:nvPicPr>
         <p:blipFill rotWithShape="1">
           <a:blip r:embed="rId2"/>
-          <a:srcRect t="29108" b="14642"/>
+          <a:srcRect t="29150" b="14600"/>
           <a:stretch/>
         </p:blipFill>
         <p:spPr>
@@ -4293,7 +4301,7 @@
       </p:pic>
       <p:grpSp>
         <p:nvGrpSpPr>
-          <p:cNvPr id="19" name="Group 10">
+          <p:cNvPr id="39" name="Group 38">
             <a:extLst>
               <a:ext uri="{FF2B5EF4-FFF2-40B4-BE49-F238E27FC236}">
                 <a16:creationId xmlns:a16="http://schemas.microsoft.com/office/drawing/2014/main" id="{E2F6F869-F143-4607-BEE5-AA6FEB71E109}"/>
@@ -4324,7 +4332,7 @@
         </p:grpSpPr>
         <p:sp useBgFill="1">
           <p:nvSpPr>
-            <p:cNvPr id="12" name="Graphic 10">
+            <p:cNvPr id="40" name="Graphic 10">
               <a:extLst>
                 <a:ext uri="{FF2B5EF4-FFF2-40B4-BE49-F238E27FC236}">
                   <a16:creationId xmlns:a16="http://schemas.microsoft.com/office/drawing/2014/main" id="{C75470B2-BBA7-4280-A6F6-FAE9E9F1CC7A}"/>
@@ -4542,7 +4550,7 @@
         </p:sp>
         <p:sp useBgFill="1">
           <p:nvSpPr>
-            <p:cNvPr id="13" name="Oval 12">
+            <p:cNvPr id="41" name="Oval 40">
               <a:extLst>
                 <a:ext uri="{FF2B5EF4-FFF2-40B4-BE49-F238E27FC236}">
                   <a16:creationId xmlns:a16="http://schemas.microsoft.com/office/drawing/2014/main" id="{9A54C6CC-DDAA-4A39-ADF6-3C8475C59AE3}"/>
@@ -4597,7 +4605,7 @@
         </p:sp>
         <p:sp useBgFill="1">
           <p:nvSpPr>
-            <p:cNvPr id="14" name="Oval 13">
+            <p:cNvPr id="42" name="Oval 41">
               <a:extLst>
                 <a:ext uri="{FF2B5EF4-FFF2-40B4-BE49-F238E27FC236}">
                   <a16:creationId xmlns:a16="http://schemas.microsoft.com/office/drawing/2014/main" id="{714358CC-CF77-4F38-89E2-D6A3ABD012B9}"/>
@@ -4652,7 +4660,7 @@
         </p:sp>
         <p:sp useBgFill="1">
           <p:nvSpPr>
-            <p:cNvPr id="15" name="Oval 14">
+            <p:cNvPr id="43" name="Oval 42">
               <a:extLst>
                 <a:ext uri="{FF2B5EF4-FFF2-40B4-BE49-F238E27FC236}">
                   <a16:creationId xmlns:a16="http://schemas.microsoft.com/office/drawing/2014/main" id="{0CB44DA0-4772-4F1E-982F-12BAC7C5845F}"/>
@@ -4708,7 +4716,7 @@
       </p:grpSp>
       <p:sp>
         <p:nvSpPr>
-          <p:cNvPr id="17" name="Rectangle 16">
+          <p:cNvPr id="45" name="Rectangle 44">
             <a:extLst>
               <a:ext uri="{FF2B5EF4-FFF2-40B4-BE49-F238E27FC236}">
                 <a16:creationId xmlns:a16="http://schemas.microsoft.com/office/drawing/2014/main" id="{816D4481-06E0-406F-B2B0-A78607E35F77}"/>
@@ -4790,7 +4798,7 @@
           <a:lstStyle/>
           <a:p>
             <a:r>
-              <a:rPr lang="de-DE" dirty="0" err="1">
+              <a:rPr lang="de-DE">
                 <a:solidFill>
                   <a:srgbClr val="FFFFFF"/>
                 </a:solidFill>
@@ -4806,7 +4814,7 @@
               <a:t> Nummer </a:t>
             </a:r>
             <a:r>
-              <a:rPr lang="de-DE" dirty="0" err="1">
+              <a:rPr lang="de-DE">
                 <a:solidFill>
                   <a:srgbClr val="FFFFFF"/>
                 </a:solidFill>
@@ -4886,12 +4894,159 @@
   <p:clrMapOvr>
     <a:masterClrMapping/>
   </p:clrMapOvr>
+  <p:timing>
+    <p:tnLst>
+      <p:par>
+        <p:cTn id="1" dur="indefinite" restart="never" nodeType="tmRoot">
+          <p:childTnLst>
+            <p:seq concurrent="1" nextAc="seek">
+              <p:cTn id="2" dur="indefinite" nodeType="mainSeq">
+                <p:childTnLst>
+                  <p:par>
+                    <p:cTn id="3" fill="hold">
+                      <p:stCondLst>
+                        <p:cond delay="indefinite"/>
+                        <p:cond evt="onBegin" delay="0">
+                          <p:tn val="2"/>
+                        </p:cond>
+                      </p:stCondLst>
+                      <p:childTnLst>
+                        <p:par>
+                          <p:cTn id="4" fill="hold">
+                            <p:stCondLst>
+                              <p:cond delay="0"/>
+                            </p:stCondLst>
+                            <p:childTnLst>
+                              <p:par>
+                                <p:cTn id="5" presetID="10" presetClass="entr" presetSubtype="0" fill="hold" grpId="0" nodeType="withEffect">
+                                  <p:stCondLst>
+                                    <p:cond delay="2000"/>
+                                  </p:stCondLst>
+                                  <p:iterate type="lt">
+                                    <p:tmPct val="10000"/>
+                                  </p:iterate>
+                                  <p:childTnLst>
+                                    <p:set>
+                                      <p:cBhvr>
+                                        <p:cTn id="6" dur="1" fill="hold">
+                                          <p:stCondLst>
+                                            <p:cond delay="0"/>
+                                          </p:stCondLst>
+                                        </p:cTn>
+                                        <p:tgtEl>
+                                          <p:spTgt spid="3">
+                                            <p:txEl>
+                                              <p:pRg st="0" end="0"/>
+                                            </p:txEl>
+                                          </p:spTgt>
+                                        </p:tgtEl>
+                                        <p:attrNameLst>
+                                          <p:attrName>style.visibility</p:attrName>
+                                        </p:attrNameLst>
+                                      </p:cBhvr>
+                                      <p:to>
+                                        <p:strVal val="visible"/>
+                                      </p:to>
+                                    </p:set>
+                                    <p:animEffect transition="in" filter="fade">
+                                      <p:cBhvr>
+                                        <p:cTn id="7" dur="400"/>
+                                        <p:tgtEl>
+                                          <p:spTgt spid="3">
+                                            <p:txEl>
+                                              <p:pRg st="0" end="0"/>
+                                            </p:txEl>
+                                          </p:spTgt>
+                                        </p:tgtEl>
+                                      </p:cBhvr>
+                                    </p:animEffect>
+                                  </p:childTnLst>
+                                </p:cTn>
+                              </p:par>
+                              <p:par>
+                                <p:cTn id="8" presetID="10" presetClass="entr" presetSubtype="0" fill="hold" grpId="0" nodeType="withEffect">
+                                  <p:stCondLst>
+                                    <p:cond delay="1000"/>
+                                  </p:stCondLst>
+                                  <p:iterate type="lt">
+                                    <p:tmPct val="10000"/>
+                                  </p:iterate>
+                                  <p:childTnLst>
+                                    <p:set>
+                                      <p:cBhvr>
+                                        <p:cTn id="9" dur="1" fill="hold">
+                                          <p:stCondLst>
+                                            <p:cond delay="0"/>
+                                          </p:stCondLst>
+                                        </p:cTn>
+                                        <p:tgtEl>
+                                          <p:spTgt spid="2"/>
+                                        </p:tgtEl>
+                                        <p:attrNameLst>
+                                          <p:attrName>style.visibility</p:attrName>
+                                        </p:attrNameLst>
+                                      </p:cBhvr>
+                                      <p:to>
+                                        <p:strVal val="visible"/>
+                                      </p:to>
+                                    </p:set>
+                                    <p:animEffect transition="in" filter="fade">
+                                      <p:cBhvr>
+                                        <p:cTn id="10" dur="400"/>
+                                        <p:tgtEl>
+                                          <p:spTgt spid="2"/>
+                                        </p:tgtEl>
+                                      </p:cBhvr>
+                                    </p:animEffect>
+                                  </p:childTnLst>
+                                </p:cTn>
+                              </p:par>
+                            </p:childTnLst>
+                          </p:cTn>
+                        </p:par>
+                      </p:childTnLst>
+                    </p:cTn>
+                  </p:par>
+                </p:childTnLst>
+              </p:cTn>
+              <p:prevCondLst>
+                <p:cond evt="onPrev" delay="0">
+                  <p:tgtEl>
+                    <p:sldTgt/>
+                  </p:tgtEl>
+                </p:cond>
+              </p:prevCondLst>
+              <p:nextCondLst>
+                <p:cond evt="onNext" delay="0">
+                  <p:tgtEl>
+                    <p:sldTgt/>
+                  </p:tgtEl>
+                </p:cond>
+              </p:nextCondLst>
+            </p:seq>
+          </p:childTnLst>
+        </p:cTn>
+      </p:par>
+    </p:tnLst>
+    <p:bldLst>
+      <p:bldP spid="2" grpId="0"/>
+      <p:bldP spid="3" grpId="0" build="p"/>
+    </p:bldLst>
+  </p:timing>
 </p:sld>
 </file>
 
 <file path=ppt/slides/slide2.xml><?xml version="1.0" encoding="utf-8"?>
 <p:sld xmlns:a="http://schemas.openxmlformats.org/drawingml/2006/main" xmlns:r="http://schemas.openxmlformats.org/officeDocument/2006/relationships" xmlns:p="http://schemas.openxmlformats.org/presentationml/2006/main">
   <p:cSld>
+    <p:bg>
+      <p:bgPr>
+        <a:solidFill>
+          <a:schemeClr val="bg1"/>
+        </a:solidFill>
+        <a:effectLst/>
+      </p:bgPr>
+    </p:bg>
     <p:spTree>
       <p:nvGrpSpPr>
         <p:cNvPr id="1" name=""/>
@@ -4906,6 +5061,610 @@
           <a:chExt cx="0" cy="0"/>
         </a:xfrm>
       </p:grpSpPr>
+      <p:sp useBgFill="1">
+        <p:nvSpPr>
+          <p:cNvPr id="65" name="Rectangle 53">
+            <a:extLst>
+              <a:ext uri="{FF2B5EF4-FFF2-40B4-BE49-F238E27FC236}">
+                <a16:creationId xmlns:a16="http://schemas.microsoft.com/office/drawing/2014/main" id="{25AD4A59-91FA-4E30-8F32-A8AB51F768C6}"/>
+              </a:ext>
+              <a:ext uri="{C183D7F6-B498-43B3-948B-1728B52AA6E4}">
+                <adec:decorative xmlns:adec="http://schemas.microsoft.com/office/drawing/2017/decorative" val="1"/>
+              </a:ext>
+            </a:extLst>
+          </p:cNvPr>
+          <p:cNvSpPr>
+            <a:spLocks noGrp="1" noRot="1" noChangeAspect="1" noMove="1" noResize="1" noEditPoints="1" noAdjustHandles="1" noChangeArrowheads="1" noChangeShapeType="1" noTextEdit="1"/>
+          </p:cNvSpPr>
+          <p:nvPr>
+            <p:extLst>
+              <p:ext uri="{386F3935-93C4-4BCD-93E2-E3B085C9AB24}">
+                <p16:designElem xmlns:p16="http://schemas.microsoft.com/office/powerpoint/2015/main" val="1"/>
+              </p:ext>
+            </p:extLst>
+          </p:nvPr>
+        </p:nvSpPr>
+        <p:spPr>
+          <a:xfrm>
+            <a:off x="0" y="0"/>
+            <a:ext cx="12192000" cy="6858000"/>
+          </a:xfrm>
+          <a:prstGeom prst="rect">
+            <a:avLst/>
+          </a:prstGeom>
+          <a:ln w="3848" cap="flat">
+            <a:noFill/>
+            <a:prstDash val="solid"/>
+            <a:miter/>
+          </a:ln>
+          <a:effectLst/>
+        </p:spPr>
+        <p:txBody>
+          <a:bodyPr rtlCol="0" anchor="ctr"/>
+          <a:lstStyle/>
+          <a:p>
+            <a:endParaRPr lang="en-US" dirty="0">
+              <a:solidFill>
+                <a:schemeClr val="tx1"/>
+              </a:solidFill>
+            </a:endParaRPr>
+          </a:p>
+        </p:txBody>
+      </p:sp>
+      <p:sp>
+        <p:nvSpPr>
+          <p:cNvPr id="66" name="Rectangle 55">
+            <a:extLst>
+              <a:ext uri="{FF2B5EF4-FFF2-40B4-BE49-F238E27FC236}">
+                <a16:creationId xmlns:a16="http://schemas.microsoft.com/office/drawing/2014/main" id="{01AF26B4-1569-483F-8223-4C515A87A527}"/>
+              </a:ext>
+              <a:ext uri="{C183D7F6-B498-43B3-948B-1728B52AA6E4}">
+                <adec:decorative xmlns:adec="http://schemas.microsoft.com/office/drawing/2017/decorative" val="1"/>
+              </a:ext>
+            </a:extLst>
+          </p:cNvPr>
+          <p:cNvSpPr>
+            <a:spLocks noGrp="1" noRot="1" noChangeAspect="1" noMove="1" noResize="1" noEditPoints="1" noAdjustHandles="1" noChangeArrowheads="1" noChangeShapeType="1" noTextEdit="1"/>
+          </p:cNvSpPr>
+          <p:nvPr>
+            <p:extLst>
+              <p:ext uri="{386F3935-93C4-4BCD-93E2-E3B085C9AB24}">
+                <p16:designElem xmlns:p16="http://schemas.microsoft.com/office/powerpoint/2015/main" val="1"/>
+              </p:ext>
+            </p:extLst>
+          </p:nvPr>
+        </p:nvSpPr>
+        <p:spPr>
+          <a:xfrm>
+            <a:off x="0" y="0"/>
+            <a:ext cx="12192000" cy="6858000"/>
+          </a:xfrm>
+          <a:prstGeom prst="rect">
+            <a:avLst/>
+          </a:prstGeom>
+          <a:solidFill>
+            <a:srgbClr val="FFFFFF">
+              <a:alpha val="10000"/>
+            </a:srgbClr>
+          </a:solidFill>
+          <a:ln w="3848" cap="flat">
+            <a:noFill/>
+            <a:prstDash val="solid"/>
+            <a:miter/>
+          </a:ln>
+          <a:effectLst/>
+        </p:spPr>
+        <p:txBody>
+          <a:bodyPr rtlCol="0" anchor="ctr"/>
+          <a:lstStyle/>
+          <a:p>
+            <a:endParaRPr lang="en-US" dirty="0">
+              <a:solidFill>
+                <a:schemeClr val="tx1"/>
+              </a:solidFill>
+            </a:endParaRPr>
+          </a:p>
+        </p:txBody>
+      </p:sp>
+      <p:pic>
+        <p:nvPicPr>
+          <p:cNvPr id="5" name="Picture 4" descr="Finanzdiagramme auf einem dunklen Display">
+            <a:extLst>
+              <a:ext uri="{FF2B5EF4-FFF2-40B4-BE49-F238E27FC236}">
+                <a16:creationId xmlns:a16="http://schemas.microsoft.com/office/drawing/2014/main" id="{40381C23-4D8D-5D00-92D7-B5D1935CD62F}"/>
+              </a:ext>
+            </a:extLst>
+          </p:cNvPr>
+          <p:cNvPicPr>
+            <a:picLocks noChangeAspect="1"/>
+          </p:cNvPicPr>
+          <p:nvPr/>
+        </p:nvPicPr>
+        <p:blipFill rotWithShape="1">
+          <a:blip r:embed="rId2"/>
+          <a:srcRect t="9978" r="-1" b="-1"/>
+          <a:stretch/>
+        </p:blipFill>
+        <p:spPr>
+          <a:xfrm>
+            <a:off x="-7798" y="10"/>
+            <a:ext cx="12199798" cy="6857990"/>
+          </a:xfrm>
+          <a:prstGeom prst="rect">
+            <a:avLst/>
+          </a:prstGeom>
+        </p:spPr>
+      </p:pic>
+      <p:grpSp>
+        <p:nvGrpSpPr>
+          <p:cNvPr id="67" name="Group 57">
+            <a:extLst>
+              <a:ext uri="{FF2B5EF4-FFF2-40B4-BE49-F238E27FC236}">
+                <a16:creationId xmlns:a16="http://schemas.microsoft.com/office/drawing/2014/main" id="{1AC8529D-DF13-4349-856C-DA81451848A7}"/>
+              </a:ext>
+              <a:ext uri="{C183D7F6-B498-43B3-948B-1728B52AA6E4}">
+                <adec:decorative xmlns:adec="http://schemas.microsoft.com/office/drawing/2017/decorative" val="1"/>
+              </a:ext>
+            </a:extLst>
+          </p:cNvPr>
+          <p:cNvGrpSpPr>
+            <a:grpSpLocks noGrp="1" noUngrp="1" noRot="1" noChangeAspect="1" noMove="1" noResize="1"/>
+          </p:cNvGrpSpPr>
+          <p:nvPr>
+            <p:extLst>
+              <p:ext uri="{386F3935-93C4-4BCD-93E2-E3B085C9AB24}">
+                <p16:designElem xmlns:p16="http://schemas.microsoft.com/office/powerpoint/2015/main" val="1"/>
+              </p:ext>
+            </p:extLst>
+          </p:nvPr>
+        </p:nvGrpSpPr>
+        <p:grpSpPr>
+          <a:xfrm>
+            <a:off x="183404" y="225822"/>
+            <a:ext cx="1847971" cy="2438142"/>
+            <a:chOff x="183404" y="225822"/>
+            <a:chExt cx="1847971" cy="2438142"/>
+          </a:xfrm>
+        </p:grpSpPr>
+        <p:sp useBgFill="1">
+          <p:nvSpPr>
+            <p:cNvPr id="59" name="Graphic 10">
+              <a:extLst>
+                <a:ext uri="{FF2B5EF4-FFF2-40B4-BE49-F238E27FC236}">
+                  <a16:creationId xmlns:a16="http://schemas.microsoft.com/office/drawing/2014/main" id="{23EB0175-B014-4375-9C83-BA3BC7588FC4}"/>
+                </a:ext>
+                <a:ext uri="{C183D7F6-B498-43B3-948B-1728B52AA6E4}">
+                  <adec:decorative xmlns:adec="http://schemas.microsoft.com/office/drawing/2017/decorative" val="1"/>
+                </a:ext>
+              </a:extLst>
+            </p:cNvPr>
+            <p:cNvSpPr/>
+            <p:nvPr>
+              <p:extLst>
+                <p:ext uri="{386F3935-93C4-4BCD-93E2-E3B085C9AB24}">
+                  <p16:designElem xmlns:p16="http://schemas.microsoft.com/office/powerpoint/2015/main" val="1"/>
+                </p:ext>
+              </p:extLst>
+            </p:nvPr>
+          </p:nvSpPr>
+          <p:spPr>
+            <a:xfrm rot="2700000">
+              <a:off x="304800" y="965970"/>
+              <a:ext cx="1066799" cy="1066799"/>
+            </a:xfrm>
+            <a:custGeom>
+              <a:avLst/>
+              <a:gdLst>
+                <a:gd name="connsiteX0" fmla="*/ 4053340 w 6859500"/>
+                <a:gd name="connsiteY0" fmla="*/ 6235893 h 6859500"/>
+                <a:gd name="connsiteX1" fmla="*/ 4053340 w 6859500"/>
+                <a:gd name="connsiteY1" fmla="*/ 4053340 h 6859500"/>
+                <a:gd name="connsiteX2" fmla="*/ 6235893 w 6859500"/>
+                <a:gd name="connsiteY2" fmla="*/ 4053340 h 6859500"/>
+                <a:gd name="connsiteX3" fmla="*/ 6859501 w 6859500"/>
+                <a:gd name="connsiteY3" fmla="*/ 3429731 h 6859500"/>
+                <a:gd name="connsiteX4" fmla="*/ 6235893 w 6859500"/>
+                <a:gd name="connsiteY4" fmla="*/ 2806123 h 6859500"/>
+                <a:gd name="connsiteX5" fmla="*/ 4053340 w 6859500"/>
+                <a:gd name="connsiteY5" fmla="*/ 2806123 h 6859500"/>
+                <a:gd name="connsiteX6" fmla="*/ 4053340 w 6859500"/>
+                <a:gd name="connsiteY6" fmla="*/ 623608 h 6859500"/>
+                <a:gd name="connsiteX7" fmla="*/ 3429731 w 6859500"/>
+                <a:gd name="connsiteY7" fmla="*/ 0 h 6859500"/>
+                <a:gd name="connsiteX8" fmla="*/ 2806123 w 6859500"/>
+                <a:gd name="connsiteY8" fmla="*/ 623608 h 6859500"/>
+                <a:gd name="connsiteX9" fmla="*/ 2806123 w 6859500"/>
+                <a:gd name="connsiteY9" fmla="*/ 2806161 h 6859500"/>
+                <a:gd name="connsiteX10" fmla="*/ 623608 w 6859500"/>
+                <a:gd name="connsiteY10" fmla="*/ 2806161 h 6859500"/>
+                <a:gd name="connsiteX11" fmla="*/ 0 w 6859500"/>
+                <a:gd name="connsiteY11" fmla="*/ 3429731 h 6859500"/>
+                <a:gd name="connsiteX12" fmla="*/ 623608 w 6859500"/>
+                <a:gd name="connsiteY12" fmla="*/ 4053340 h 6859500"/>
+                <a:gd name="connsiteX13" fmla="*/ 2806161 w 6859500"/>
+                <a:gd name="connsiteY13" fmla="*/ 4053340 h 6859500"/>
+                <a:gd name="connsiteX14" fmla="*/ 2806161 w 6859500"/>
+                <a:gd name="connsiteY14" fmla="*/ 6235893 h 6859500"/>
+                <a:gd name="connsiteX15" fmla="*/ 3429770 w 6859500"/>
+                <a:gd name="connsiteY15" fmla="*/ 6859501 h 6859500"/>
+                <a:gd name="connsiteX16" fmla="*/ 4053340 w 6859500"/>
+                <a:gd name="connsiteY16" fmla="*/ 6235893 h 6859500"/>
+              </a:gdLst>
+              <a:ahLst/>
+              <a:cxnLst>
+                <a:cxn ang="0">
+                  <a:pos x="connsiteX0" y="connsiteY0"/>
+                </a:cxn>
+                <a:cxn ang="0">
+                  <a:pos x="connsiteX1" y="connsiteY1"/>
+                </a:cxn>
+                <a:cxn ang="0">
+                  <a:pos x="connsiteX2" y="connsiteY2"/>
+                </a:cxn>
+                <a:cxn ang="0">
+                  <a:pos x="connsiteX3" y="connsiteY3"/>
+                </a:cxn>
+                <a:cxn ang="0">
+                  <a:pos x="connsiteX4" y="connsiteY4"/>
+                </a:cxn>
+                <a:cxn ang="0">
+                  <a:pos x="connsiteX5" y="connsiteY5"/>
+                </a:cxn>
+                <a:cxn ang="0">
+                  <a:pos x="connsiteX6" y="connsiteY6"/>
+                </a:cxn>
+                <a:cxn ang="0">
+                  <a:pos x="connsiteX7" y="connsiteY7"/>
+                </a:cxn>
+                <a:cxn ang="0">
+                  <a:pos x="connsiteX8" y="connsiteY8"/>
+                </a:cxn>
+                <a:cxn ang="0">
+                  <a:pos x="connsiteX9" y="connsiteY9"/>
+                </a:cxn>
+                <a:cxn ang="0">
+                  <a:pos x="connsiteX10" y="connsiteY10"/>
+                </a:cxn>
+                <a:cxn ang="0">
+                  <a:pos x="connsiteX11" y="connsiteY11"/>
+                </a:cxn>
+                <a:cxn ang="0">
+                  <a:pos x="connsiteX12" y="connsiteY12"/>
+                </a:cxn>
+                <a:cxn ang="0">
+                  <a:pos x="connsiteX13" y="connsiteY13"/>
+                </a:cxn>
+                <a:cxn ang="0">
+                  <a:pos x="connsiteX14" y="connsiteY14"/>
+                </a:cxn>
+                <a:cxn ang="0">
+                  <a:pos x="connsiteX15" y="connsiteY15"/>
+                </a:cxn>
+                <a:cxn ang="0">
+                  <a:pos x="connsiteX16" y="connsiteY16"/>
+                </a:cxn>
+              </a:cxnLst>
+              <a:rect l="l" t="t" r="r" b="b"/>
+              <a:pathLst>
+                <a:path w="6859500" h="6859500">
+                  <a:moveTo>
+                    <a:pt x="4053340" y="6235893"/>
+                  </a:moveTo>
+                  <a:lnTo>
+                    <a:pt x="4053340" y="4053340"/>
+                  </a:lnTo>
+                  <a:lnTo>
+                    <a:pt x="6235893" y="4053340"/>
+                  </a:lnTo>
+                  <a:cubicBezTo>
+                    <a:pt x="6580293" y="4053340"/>
+                    <a:pt x="6859501" y="3774132"/>
+                    <a:pt x="6859501" y="3429731"/>
+                  </a:cubicBezTo>
+                  <a:cubicBezTo>
+                    <a:pt x="6859501" y="3085330"/>
+                    <a:pt x="6580332" y="2806123"/>
+                    <a:pt x="6235893" y="2806123"/>
+                  </a:cubicBezTo>
+                  <a:lnTo>
+                    <a:pt x="4053340" y="2806123"/>
+                  </a:lnTo>
+                  <a:lnTo>
+                    <a:pt x="4053340" y="623608"/>
+                  </a:lnTo>
+                  <a:cubicBezTo>
+                    <a:pt x="4053340" y="279208"/>
+                    <a:pt x="3774171" y="0"/>
+                    <a:pt x="3429731" y="0"/>
+                  </a:cubicBezTo>
+                  <a:cubicBezTo>
+                    <a:pt x="3085330" y="0"/>
+                    <a:pt x="2806123" y="279208"/>
+                    <a:pt x="2806123" y="623608"/>
+                  </a:cubicBezTo>
+                  <a:lnTo>
+                    <a:pt x="2806123" y="2806161"/>
+                  </a:lnTo>
+                  <a:lnTo>
+                    <a:pt x="623608" y="2806161"/>
+                  </a:lnTo>
+                  <a:cubicBezTo>
+                    <a:pt x="279208" y="2806161"/>
+                    <a:pt x="0" y="3085369"/>
+                    <a:pt x="0" y="3429731"/>
+                  </a:cubicBezTo>
+                  <a:cubicBezTo>
+                    <a:pt x="0" y="3774132"/>
+                    <a:pt x="279208" y="4053340"/>
+                    <a:pt x="623608" y="4053340"/>
+                  </a:cubicBezTo>
+                  <a:lnTo>
+                    <a:pt x="2806161" y="4053340"/>
+                  </a:lnTo>
+                  <a:lnTo>
+                    <a:pt x="2806161" y="6235893"/>
+                  </a:lnTo>
+                  <a:cubicBezTo>
+                    <a:pt x="2806161" y="6580293"/>
+                    <a:pt x="3085369" y="6859501"/>
+                    <a:pt x="3429770" y="6859501"/>
+                  </a:cubicBezTo>
+                  <a:cubicBezTo>
+                    <a:pt x="3774171" y="6859501"/>
+                    <a:pt x="4053340" y="6580293"/>
+                    <a:pt x="4053340" y="6235893"/>
+                  </a:cubicBezTo>
+                  <a:close/>
+                </a:path>
+              </a:pathLst>
+            </a:custGeom>
+            <a:ln w="3848" cap="flat">
+              <a:noFill/>
+              <a:prstDash val="solid"/>
+              <a:miter/>
+            </a:ln>
+            <a:effectLst>
+              <a:glow rad="152400">
+                <a:srgbClr val="000000">
+                  <a:alpha val="4000"/>
+                </a:srgbClr>
+              </a:glow>
+              <a:outerShdw blurRad="101600" dist="38100" dir="16200000" rotWithShape="0">
+                <a:srgbClr val="000000">
+                  <a:alpha val="5000"/>
+                </a:srgbClr>
+              </a:outerShdw>
+            </a:effectLst>
+          </p:spPr>
+          <p:txBody>
+            <a:bodyPr rtlCol="0" anchor="ctr"/>
+            <a:lstStyle/>
+            <a:p>
+              <a:endParaRPr lang="en-US" dirty="0"/>
+            </a:p>
+          </p:txBody>
+        </p:sp>
+        <p:sp useBgFill="1">
+          <p:nvSpPr>
+            <p:cNvPr id="68" name="Oval 59">
+              <a:extLst>
+                <a:ext uri="{FF2B5EF4-FFF2-40B4-BE49-F238E27FC236}">
+                  <a16:creationId xmlns:a16="http://schemas.microsoft.com/office/drawing/2014/main" id="{23CA1A51-8DB4-445D-8FE3-498DB75CA588}"/>
+                </a:ext>
+                <a:ext uri="{C183D7F6-B498-43B3-948B-1728B52AA6E4}">
+                  <adec:decorative xmlns:adec="http://schemas.microsoft.com/office/drawing/2017/decorative" val="1"/>
+                </a:ext>
+              </a:extLst>
+            </p:cNvPr>
+            <p:cNvSpPr/>
+            <p:nvPr>
+              <p:extLst>
+                <p:ext uri="{386F3935-93C4-4BCD-93E2-E3B085C9AB24}">
+                  <p16:designElem xmlns:p16="http://schemas.microsoft.com/office/powerpoint/2015/main" val="1"/>
+                </p:ext>
+              </p:extLst>
+            </p:nvPr>
+          </p:nvSpPr>
+          <p:spPr>
+            <a:xfrm rot="10800000">
+              <a:off x="1815651" y="1342540"/>
+              <a:ext cx="215724" cy="215724"/>
+            </a:xfrm>
+            <a:prstGeom prst="ellipse">
+              <a:avLst/>
+            </a:prstGeom>
+            <a:ln w="3848" cap="flat">
+              <a:noFill/>
+              <a:prstDash val="solid"/>
+              <a:miter/>
+            </a:ln>
+            <a:effectLst>
+              <a:glow rad="152400">
+                <a:srgbClr val="000000">
+                  <a:alpha val="4000"/>
+                </a:srgbClr>
+              </a:glow>
+              <a:outerShdw blurRad="101600" dist="38100" dir="16200000" rotWithShape="0">
+                <a:srgbClr val="000000">
+                  <a:alpha val="5000"/>
+                </a:srgbClr>
+              </a:outerShdw>
+            </a:effectLst>
+          </p:spPr>
+          <p:txBody>
+            <a:bodyPr rtlCol="0" anchor="ctr"/>
+            <a:lstStyle/>
+            <a:p>
+              <a:endParaRPr lang="en-US" dirty="0"/>
+            </a:p>
+          </p:txBody>
+        </p:sp>
+        <p:sp useBgFill="1">
+          <p:nvSpPr>
+            <p:cNvPr id="69" name="Oval 60">
+              <a:extLst>
+                <a:ext uri="{FF2B5EF4-FFF2-40B4-BE49-F238E27FC236}">
+                  <a16:creationId xmlns:a16="http://schemas.microsoft.com/office/drawing/2014/main" id="{75DDD5AB-14AC-434C-95CC-18B81FAD36B9}"/>
+                </a:ext>
+                <a:ext uri="{C183D7F6-B498-43B3-948B-1728B52AA6E4}">
+                  <adec:decorative xmlns:adec="http://schemas.microsoft.com/office/drawing/2017/decorative" val="1"/>
+                </a:ext>
+              </a:extLst>
+            </p:cNvPr>
+            <p:cNvSpPr/>
+            <p:nvPr>
+              <p:extLst>
+                <p:ext uri="{386F3935-93C4-4BCD-93E2-E3B085C9AB24}">
+                  <p16:designElem xmlns:p16="http://schemas.microsoft.com/office/powerpoint/2015/main" val="1"/>
+                </p:ext>
+              </p:extLst>
+            </p:nvPr>
+          </p:nvSpPr>
+          <p:spPr>
+            <a:xfrm rot="10800000">
+              <a:off x="183404" y="225822"/>
+              <a:ext cx="474023" cy="474023"/>
+            </a:xfrm>
+            <a:prstGeom prst="ellipse">
+              <a:avLst/>
+            </a:prstGeom>
+            <a:ln w="3848" cap="flat">
+              <a:noFill/>
+              <a:prstDash val="solid"/>
+              <a:miter/>
+            </a:ln>
+            <a:effectLst>
+              <a:glow rad="152400">
+                <a:srgbClr val="000000">
+                  <a:alpha val="4000"/>
+                </a:srgbClr>
+              </a:glow>
+              <a:outerShdw blurRad="101600" dist="38100" dir="16200000" rotWithShape="0">
+                <a:srgbClr val="000000">
+                  <a:alpha val="5000"/>
+                </a:srgbClr>
+              </a:outerShdw>
+            </a:effectLst>
+          </p:spPr>
+          <p:txBody>
+            <a:bodyPr rtlCol="0" anchor="ctr"/>
+            <a:lstStyle/>
+            <a:p>
+              <a:endParaRPr lang="en-US"/>
+            </a:p>
+          </p:txBody>
+        </p:sp>
+        <p:sp useBgFill="1">
+          <p:nvSpPr>
+            <p:cNvPr id="70" name="Oval 61">
+              <a:extLst>
+                <a:ext uri="{FF2B5EF4-FFF2-40B4-BE49-F238E27FC236}">
+                  <a16:creationId xmlns:a16="http://schemas.microsoft.com/office/drawing/2014/main" id="{673FC915-211E-480B-8EC6-9659D9FCA15F}"/>
+                </a:ext>
+                <a:ext uri="{C183D7F6-B498-43B3-948B-1728B52AA6E4}">
+                  <adec:decorative xmlns:adec="http://schemas.microsoft.com/office/drawing/2017/decorative" val="1"/>
+                </a:ext>
+              </a:extLst>
+            </p:cNvPr>
+            <p:cNvSpPr/>
+            <p:nvPr>
+              <p:extLst>
+                <p:ext uri="{386F3935-93C4-4BCD-93E2-E3B085C9AB24}">
+                  <p16:designElem xmlns:p16="http://schemas.microsoft.com/office/powerpoint/2015/main" val="1"/>
+                </p:ext>
+              </p:extLst>
+            </p:nvPr>
+          </p:nvSpPr>
+          <p:spPr>
+            <a:xfrm rot="10800000">
+              <a:off x="583574" y="2333139"/>
+              <a:ext cx="330825" cy="330825"/>
+            </a:xfrm>
+            <a:prstGeom prst="ellipse">
+              <a:avLst/>
+            </a:prstGeom>
+            <a:ln w="3848" cap="flat">
+              <a:noFill/>
+              <a:prstDash val="solid"/>
+              <a:miter/>
+            </a:ln>
+            <a:effectLst>
+              <a:glow rad="152400">
+                <a:srgbClr val="000000">
+                  <a:alpha val="4000"/>
+                </a:srgbClr>
+              </a:glow>
+              <a:outerShdw blurRad="101600" dist="38100" dir="16200000" rotWithShape="0">
+                <a:srgbClr val="000000">
+                  <a:alpha val="5000"/>
+                </a:srgbClr>
+              </a:outerShdw>
+            </a:effectLst>
+          </p:spPr>
+          <p:txBody>
+            <a:bodyPr rtlCol="0" anchor="ctr"/>
+            <a:lstStyle/>
+            <a:p>
+              <a:endParaRPr lang="en-US" dirty="0"/>
+            </a:p>
+          </p:txBody>
+        </p:sp>
+      </p:grpSp>
+      <p:sp>
+        <p:nvSpPr>
+          <p:cNvPr id="64" name="Rectangle 63">
+            <a:extLst>
+              <a:ext uri="{FF2B5EF4-FFF2-40B4-BE49-F238E27FC236}">
+                <a16:creationId xmlns:a16="http://schemas.microsoft.com/office/drawing/2014/main" id="{EA80DA9C-57E0-4991-B11A-51E132563976}"/>
+              </a:ext>
+              <a:ext uri="{C183D7F6-B498-43B3-948B-1728B52AA6E4}">
+                <adec:decorative xmlns:adec="http://schemas.microsoft.com/office/drawing/2017/decorative" val="1"/>
+              </a:ext>
+            </a:extLst>
+          </p:cNvPr>
+          <p:cNvSpPr>
+            <a:spLocks noGrp="1" noRot="1" noChangeAspect="1" noMove="1" noResize="1" noEditPoints="1" noAdjustHandles="1" noChangeArrowheads="1" noChangeShapeType="1" noTextEdit="1"/>
+          </p:cNvSpPr>
+          <p:nvPr>
+            <p:extLst>
+              <p:ext uri="{386F3935-93C4-4BCD-93E2-E3B085C9AB24}">
+                <p16:designElem xmlns:p16="http://schemas.microsoft.com/office/powerpoint/2015/main" val="1"/>
+              </p:ext>
+            </p:extLst>
+          </p:nvPr>
+        </p:nvSpPr>
+        <p:spPr>
+          <a:xfrm>
+            <a:off x="0" y="0"/>
+            <a:ext cx="12192000" cy="6858000"/>
+          </a:xfrm>
+          <a:prstGeom prst="rect">
+            <a:avLst/>
+          </a:prstGeom>
+          <a:solidFill>
+            <a:schemeClr val="accent2">
+              <a:alpha val="40000"/>
+            </a:schemeClr>
+          </a:solidFill>
+          <a:ln w="3848" cap="flat">
+            <a:noFill/>
+            <a:prstDash val="solid"/>
+            <a:miter/>
+          </a:ln>
+          <a:effectLst/>
+        </p:spPr>
+        <p:txBody>
+          <a:bodyPr rtlCol="0" anchor="ctr"/>
+          <a:lstStyle/>
+          <a:p>
+            <a:endParaRPr lang="en-US" dirty="0">
+              <a:solidFill>
+                <a:schemeClr val="tx1"/>
+              </a:solidFill>
+            </a:endParaRPr>
+          </a:p>
+        </p:txBody>
+      </p:sp>
       <p:sp>
         <p:nvSpPr>
           <p:cNvPr id="2" name="Titel 1">
@@ -4922,13 +5681,25 @@
             <p:ph type="title"/>
           </p:nvPr>
         </p:nvSpPr>
-        <p:spPr/>
+        <p:spPr>
+          <a:xfrm>
+            <a:off x="822352" y="566126"/>
+            <a:ext cx="10531448" cy="2210521"/>
+          </a:xfrm>
+        </p:spPr>
         <p:txBody>
-          <a:bodyPr/>
+          <a:bodyPr anchor="b">
+            <a:normAutofit/>
+          </a:bodyPr>
           <a:lstStyle/>
           <a:p>
-            <a:r>
-              <a:rPr lang="de-DE"/>
+            <a:pPr algn="ctr"/>
+            <a:r>
+              <a:rPr lang="de-DE">
+                <a:solidFill>
+                  <a:srgbClr val="FFFFFF"/>
+                </a:solidFill>
+              </a:rPr>
               <a:t>Übersicht</a:t>
             </a:r>
           </a:p>
@@ -4950,12 +5721,73 @@
             <p:ph idx="1"/>
           </p:nvPr>
         </p:nvSpPr>
-        <p:spPr/>
+        <p:spPr>
+          <a:xfrm>
+            <a:off x="1992663" y="2948363"/>
+            <a:ext cx="8188032" cy="3176250"/>
+          </a:xfrm>
+        </p:spPr>
         <p:txBody>
-          <a:bodyPr/>
+          <a:bodyPr anchor="t">
+            <a:normAutofit/>
+          </a:bodyPr>
           <a:lstStyle/>
           <a:p>
-            <a:endParaRPr lang="de-DE"/>
+            <a:pPr algn="ctr"/>
+            <a:r>
+              <a:rPr lang="de-DE" sz="1800" dirty="0">
+                <a:solidFill>
+                  <a:srgbClr val="FFFFFF"/>
+                </a:solidFill>
+              </a:rPr>
+              <a:t>ER-Diagramm</a:t>
+            </a:r>
+          </a:p>
+          <a:p>
+            <a:pPr algn="ctr"/>
+            <a:r>
+              <a:rPr lang="de-DE" sz="1800" dirty="0">
+                <a:solidFill>
+                  <a:srgbClr val="FFFFFF"/>
+                </a:solidFill>
+              </a:rPr>
+              <a:t>Kostenkalkulation</a:t>
+            </a:r>
+          </a:p>
+          <a:p>
+            <a:pPr algn="ctr"/>
+            <a:r>
+              <a:rPr lang="de-DE" sz="1800" dirty="0">
+                <a:solidFill>
+                  <a:srgbClr val="FFFFFF"/>
+                </a:solidFill>
+              </a:rPr>
+              <a:t>UML-Diagramm</a:t>
+            </a:r>
+          </a:p>
+          <a:p>
+            <a:pPr algn="ctr"/>
+            <a:r>
+              <a:rPr lang="de-DE" sz="1800" dirty="0">
+                <a:solidFill>
+                  <a:srgbClr val="FFFFFF"/>
+                </a:solidFill>
+              </a:rPr>
+              <a:t>Code </a:t>
+            </a:r>
+            <a:r>
+              <a:rPr lang="de-DE" sz="1800" dirty="0" err="1">
+                <a:solidFill>
+                  <a:srgbClr val="FFFFFF"/>
+                </a:solidFill>
+              </a:rPr>
+              <a:t>Snippets</a:t>
+            </a:r>
+            <a:endParaRPr lang="de-DE" sz="1800" dirty="0">
+              <a:solidFill>
+                <a:srgbClr val="FFFFFF"/>
+              </a:solidFill>
+            </a:endParaRPr>
           </a:p>
         </p:txBody>
       </p:sp>
@@ -4963,6 +5795,2754 @@
     <p:extLst>
       <p:ext uri="{BB962C8B-B14F-4D97-AF65-F5344CB8AC3E}">
         <p14:creationId xmlns:p14="http://schemas.microsoft.com/office/powerpoint/2010/main" val="4066767039"/>
+      </p:ext>
+    </p:extLst>
+  </p:cSld>
+  <p:clrMapOvr>
+    <a:masterClrMapping/>
+  </p:clrMapOvr>
+</p:sld>
+</file>
+
+<file path=ppt/slides/slide3.xml><?xml version="1.0" encoding="utf-8"?>
+<p:sld xmlns:a="http://schemas.openxmlformats.org/drawingml/2006/main" xmlns:r="http://schemas.openxmlformats.org/officeDocument/2006/relationships" xmlns:p="http://schemas.openxmlformats.org/presentationml/2006/main">
+  <p:cSld>
+    <p:bg>
+      <p:bgPr>
+        <a:solidFill>
+          <a:schemeClr val="bg1"/>
+        </a:solidFill>
+        <a:effectLst/>
+      </p:bgPr>
+    </p:bg>
+    <p:spTree>
+      <p:nvGrpSpPr>
+        <p:cNvPr id="1" name=""/>
+        <p:cNvGrpSpPr/>
+        <p:nvPr/>
+      </p:nvGrpSpPr>
+      <p:grpSpPr>
+        <a:xfrm>
+          <a:off x="0" y="0"/>
+          <a:ext cx="0" cy="0"/>
+          <a:chOff x="0" y="0"/>
+          <a:chExt cx="0" cy="0"/>
+        </a:xfrm>
+      </p:grpSpPr>
+      <p:sp useBgFill="1">
+        <p:nvSpPr>
+          <p:cNvPr id="93" name="Rectangle 92">
+            <a:extLst>
+              <a:ext uri="{FF2B5EF4-FFF2-40B4-BE49-F238E27FC236}">
+                <a16:creationId xmlns:a16="http://schemas.microsoft.com/office/drawing/2014/main" id="{25AD4A59-91FA-4E30-8F32-A8AB51F768C6}"/>
+              </a:ext>
+              <a:ext uri="{C183D7F6-B498-43B3-948B-1728B52AA6E4}">
+                <adec:decorative xmlns:adec="http://schemas.microsoft.com/office/drawing/2017/decorative" val="1"/>
+              </a:ext>
+            </a:extLst>
+          </p:cNvPr>
+          <p:cNvSpPr>
+            <a:spLocks noGrp="1" noRot="1" noChangeAspect="1" noMove="1" noResize="1" noEditPoints="1" noAdjustHandles="1" noChangeArrowheads="1" noChangeShapeType="1" noTextEdit="1"/>
+          </p:cNvSpPr>
+          <p:nvPr>
+            <p:extLst>
+              <p:ext uri="{386F3935-93C4-4BCD-93E2-E3B085C9AB24}">
+                <p16:designElem xmlns:p16="http://schemas.microsoft.com/office/powerpoint/2015/main" val="1"/>
+              </p:ext>
+            </p:extLst>
+          </p:nvPr>
+        </p:nvSpPr>
+        <p:spPr>
+          <a:xfrm>
+            <a:off x="0" y="0"/>
+            <a:ext cx="12192000" cy="6858000"/>
+          </a:xfrm>
+          <a:prstGeom prst="rect">
+            <a:avLst/>
+          </a:prstGeom>
+          <a:ln w="3848" cap="flat">
+            <a:noFill/>
+            <a:prstDash val="solid"/>
+            <a:miter/>
+          </a:ln>
+          <a:effectLst/>
+        </p:spPr>
+        <p:txBody>
+          <a:bodyPr rtlCol="0" anchor="ctr"/>
+          <a:lstStyle/>
+          <a:p>
+            <a:endParaRPr lang="en-US" dirty="0">
+              <a:solidFill>
+                <a:schemeClr val="tx1"/>
+              </a:solidFill>
+            </a:endParaRPr>
+          </a:p>
+        </p:txBody>
+      </p:sp>
+      <p:sp>
+        <p:nvSpPr>
+          <p:cNvPr id="95" name="Rectangle 94">
+            <a:extLst>
+              <a:ext uri="{FF2B5EF4-FFF2-40B4-BE49-F238E27FC236}">
+                <a16:creationId xmlns:a16="http://schemas.microsoft.com/office/drawing/2014/main" id="{01AF26B4-1569-483F-8223-4C515A87A527}"/>
+              </a:ext>
+              <a:ext uri="{C183D7F6-B498-43B3-948B-1728B52AA6E4}">
+                <adec:decorative xmlns:adec="http://schemas.microsoft.com/office/drawing/2017/decorative" val="1"/>
+              </a:ext>
+            </a:extLst>
+          </p:cNvPr>
+          <p:cNvSpPr>
+            <a:spLocks noGrp="1" noRot="1" noChangeAspect="1" noMove="1" noResize="1" noEditPoints="1" noAdjustHandles="1" noChangeArrowheads="1" noChangeShapeType="1" noTextEdit="1"/>
+          </p:cNvSpPr>
+          <p:nvPr>
+            <p:extLst>
+              <p:ext uri="{386F3935-93C4-4BCD-93E2-E3B085C9AB24}">
+                <p16:designElem xmlns:p16="http://schemas.microsoft.com/office/powerpoint/2015/main" val="1"/>
+              </p:ext>
+            </p:extLst>
+          </p:nvPr>
+        </p:nvSpPr>
+        <p:spPr>
+          <a:xfrm>
+            <a:off x="0" y="0"/>
+            <a:ext cx="12192000" cy="6858000"/>
+          </a:xfrm>
+          <a:prstGeom prst="rect">
+            <a:avLst/>
+          </a:prstGeom>
+          <a:solidFill>
+            <a:srgbClr val="FFFFFF">
+              <a:alpha val="10000"/>
+            </a:srgbClr>
+          </a:solidFill>
+          <a:ln w="3848" cap="flat">
+            <a:noFill/>
+            <a:prstDash val="solid"/>
+            <a:miter/>
+          </a:ln>
+          <a:effectLst/>
+        </p:spPr>
+        <p:txBody>
+          <a:bodyPr rtlCol="0" anchor="ctr"/>
+          <a:lstStyle/>
+          <a:p>
+            <a:endParaRPr lang="en-US" dirty="0">
+              <a:solidFill>
+                <a:schemeClr val="tx1"/>
+              </a:solidFill>
+            </a:endParaRPr>
+          </a:p>
+        </p:txBody>
+      </p:sp>
+      <p:pic>
+        <p:nvPicPr>
+          <p:cNvPr id="11" name="Grafik 10" descr="Ein Bild, das Nacht, Screenshot, Wasser, Licht enthält.&#10;&#10;Automatisch generierte Beschreibung">
+            <a:extLst>
+              <a:ext uri="{FF2B5EF4-FFF2-40B4-BE49-F238E27FC236}">
+                <a16:creationId xmlns:a16="http://schemas.microsoft.com/office/drawing/2014/main" id="{3F0C0D30-E617-C507-B6D4-CFD948F1B192}"/>
+              </a:ext>
+            </a:extLst>
+          </p:cNvPr>
+          <p:cNvPicPr>
+            <a:picLocks noChangeAspect="1"/>
+          </p:cNvPicPr>
+          <p:nvPr/>
+        </p:nvPicPr>
+        <p:blipFill rotWithShape="1">
+          <a:blip r:embed="rId2">
+            <a:extLst>
+              <a:ext uri="{28A0092B-C50C-407E-A947-70E740481C1C}">
+                <a14:useLocalDpi xmlns:a14="http://schemas.microsoft.com/office/drawing/2010/main" val="0"/>
+              </a:ext>
+            </a:extLst>
+          </a:blip>
+          <a:srcRect r="25"/>
+          <a:stretch/>
+        </p:blipFill>
+        <p:spPr>
+          <a:xfrm>
+            <a:off x="-7798" y="-118872"/>
+            <a:ext cx="12400245" cy="7086600"/>
+          </a:xfrm>
+          <a:prstGeom prst="rect">
+            <a:avLst/>
+          </a:prstGeom>
+        </p:spPr>
+      </p:pic>
+      <p:grpSp>
+        <p:nvGrpSpPr>
+          <p:cNvPr id="97" name="Group 96">
+            <a:extLst>
+              <a:ext uri="{FF2B5EF4-FFF2-40B4-BE49-F238E27FC236}">
+                <a16:creationId xmlns:a16="http://schemas.microsoft.com/office/drawing/2014/main" id="{1AC8529D-DF13-4349-856C-DA81451848A7}"/>
+              </a:ext>
+              <a:ext uri="{C183D7F6-B498-43B3-948B-1728B52AA6E4}">
+                <adec:decorative xmlns:adec="http://schemas.microsoft.com/office/drawing/2017/decorative" val="1"/>
+              </a:ext>
+            </a:extLst>
+          </p:cNvPr>
+          <p:cNvGrpSpPr>
+            <a:grpSpLocks noGrp="1" noUngrp="1" noRot="1" noChangeAspect="1" noMove="1" noResize="1"/>
+          </p:cNvGrpSpPr>
+          <p:nvPr>
+            <p:extLst>
+              <p:ext uri="{386F3935-93C4-4BCD-93E2-E3B085C9AB24}">
+                <p16:designElem xmlns:p16="http://schemas.microsoft.com/office/powerpoint/2015/main" val="1"/>
+              </p:ext>
+            </p:extLst>
+          </p:nvPr>
+        </p:nvGrpSpPr>
+        <p:grpSpPr>
+          <a:xfrm>
+            <a:off x="183404" y="225822"/>
+            <a:ext cx="1847971" cy="2438142"/>
+            <a:chOff x="183404" y="225822"/>
+            <a:chExt cx="1847971" cy="2438142"/>
+          </a:xfrm>
+        </p:grpSpPr>
+        <p:sp useBgFill="1">
+          <p:nvSpPr>
+            <p:cNvPr id="98" name="Graphic 10">
+              <a:extLst>
+                <a:ext uri="{FF2B5EF4-FFF2-40B4-BE49-F238E27FC236}">
+                  <a16:creationId xmlns:a16="http://schemas.microsoft.com/office/drawing/2014/main" id="{23EB0175-B014-4375-9C83-BA3BC7588FC4}"/>
+                </a:ext>
+                <a:ext uri="{C183D7F6-B498-43B3-948B-1728B52AA6E4}">
+                  <adec:decorative xmlns:adec="http://schemas.microsoft.com/office/drawing/2017/decorative" val="1"/>
+                </a:ext>
+              </a:extLst>
+            </p:cNvPr>
+            <p:cNvSpPr/>
+            <p:nvPr>
+              <p:extLst>
+                <p:ext uri="{386F3935-93C4-4BCD-93E2-E3B085C9AB24}">
+                  <p16:designElem xmlns:p16="http://schemas.microsoft.com/office/powerpoint/2015/main" val="1"/>
+                </p:ext>
+              </p:extLst>
+            </p:nvPr>
+          </p:nvSpPr>
+          <p:spPr>
+            <a:xfrm rot="2700000">
+              <a:off x="304800" y="965970"/>
+              <a:ext cx="1066799" cy="1066799"/>
+            </a:xfrm>
+            <a:custGeom>
+              <a:avLst/>
+              <a:gdLst>
+                <a:gd name="connsiteX0" fmla="*/ 4053340 w 6859500"/>
+                <a:gd name="connsiteY0" fmla="*/ 6235893 h 6859500"/>
+                <a:gd name="connsiteX1" fmla="*/ 4053340 w 6859500"/>
+                <a:gd name="connsiteY1" fmla="*/ 4053340 h 6859500"/>
+                <a:gd name="connsiteX2" fmla="*/ 6235893 w 6859500"/>
+                <a:gd name="connsiteY2" fmla="*/ 4053340 h 6859500"/>
+                <a:gd name="connsiteX3" fmla="*/ 6859501 w 6859500"/>
+                <a:gd name="connsiteY3" fmla="*/ 3429731 h 6859500"/>
+                <a:gd name="connsiteX4" fmla="*/ 6235893 w 6859500"/>
+                <a:gd name="connsiteY4" fmla="*/ 2806123 h 6859500"/>
+                <a:gd name="connsiteX5" fmla="*/ 4053340 w 6859500"/>
+                <a:gd name="connsiteY5" fmla="*/ 2806123 h 6859500"/>
+                <a:gd name="connsiteX6" fmla="*/ 4053340 w 6859500"/>
+                <a:gd name="connsiteY6" fmla="*/ 623608 h 6859500"/>
+                <a:gd name="connsiteX7" fmla="*/ 3429731 w 6859500"/>
+                <a:gd name="connsiteY7" fmla="*/ 0 h 6859500"/>
+                <a:gd name="connsiteX8" fmla="*/ 2806123 w 6859500"/>
+                <a:gd name="connsiteY8" fmla="*/ 623608 h 6859500"/>
+                <a:gd name="connsiteX9" fmla="*/ 2806123 w 6859500"/>
+                <a:gd name="connsiteY9" fmla="*/ 2806161 h 6859500"/>
+                <a:gd name="connsiteX10" fmla="*/ 623608 w 6859500"/>
+                <a:gd name="connsiteY10" fmla="*/ 2806161 h 6859500"/>
+                <a:gd name="connsiteX11" fmla="*/ 0 w 6859500"/>
+                <a:gd name="connsiteY11" fmla="*/ 3429731 h 6859500"/>
+                <a:gd name="connsiteX12" fmla="*/ 623608 w 6859500"/>
+                <a:gd name="connsiteY12" fmla="*/ 4053340 h 6859500"/>
+                <a:gd name="connsiteX13" fmla="*/ 2806161 w 6859500"/>
+                <a:gd name="connsiteY13" fmla="*/ 4053340 h 6859500"/>
+                <a:gd name="connsiteX14" fmla="*/ 2806161 w 6859500"/>
+                <a:gd name="connsiteY14" fmla="*/ 6235893 h 6859500"/>
+                <a:gd name="connsiteX15" fmla="*/ 3429770 w 6859500"/>
+                <a:gd name="connsiteY15" fmla="*/ 6859501 h 6859500"/>
+                <a:gd name="connsiteX16" fmla="*/ 4053340 w 6859500"/>
+                <a:gd name="connsiteY16" fmla="*/ 6235893 h 6859500"/>
+              </a:gdLst>
+              <a:ahLst/>
+              <a:cxnLst>
+                <a:cxn ang="0">
+                  <a:pos x="connsiteX0" y="connsiteY0"/>
+                </a:cxn>
+                <a:cxn ang="0">
+                  <a:pos x="connsiteX1" y="connsiteY1"/>
+                </a:cxn>
+                <a:cxn ang="0">
+                  <a:pos x="connsiteX2" y="connsiteY2"/>
+                </a:cxn>
+                <a:cxn ang="0">
+                  <a:pos x="connsiteX3" y="connsiteY3"/>
+                </a:cxn>
+                <a:cxn ang="0">
+                  <a:pos x="connsiteX4" y="connsiteY4"/>
+                </a:cxn>
+                <a:cxn ang="0">
+                  <a:pos x="connsiteX5" y="connsiteY5"/>
+                </a:cxn>
+                <a:cxn ang="0">
+                  <a:pos x="connsiteX6" y="connsiteY6"/>
+                </a:cxn>
+                <a:cxn ang="0">
+                  <a:pos x="connsiteX7" y="connsiteY7"/>
+                </a:cxn>
+                <a:cxn ang="0">
+                  <a:pos x="connsiteX8" y="connsiteY8"/>
+                </a:cxn>
+                <a:cxn ang="0">
+                  <a:pos x="connsiteX9" y="connsiteY9"/>
+                </a:cxn>
+                <a:cxn ang="0">
+                  <a:pos x="connsiteX10" y="connsiteY10"/>
+                </a:cxn>
+                <a:cxn ang="0">
+                  <a:pos x="connsiteX11" y="connsiteY11"/>
+                </a:cxn>
+                <a:cxn ang="0">
+                  <a:pos x="connsiteX12" y="connsiteY12"/>
+                </a:cxn>
+                <a:cxn ang="0">
+                  <a:pos x="connsiteX13" y="connsiteY13"/>
+                </a:cxn>
+                <a:cxn ang="0">
+                  <a:pos x="connsiteX14" y="connsiteY14"/>
+                </a:cxn>
+                <a:cxn ang="0">
+                  <a:pos x="connsiteX15" y="connsiteY15"/>
+                </a:cxn>
+                <a:cxn ang="0">
+                  <a:pos x="connsiteX16" y="connsiteY16"/>
+                </a:cxn>
+              </a:cxnLst>
+              <a:rect l="l" t="t" r="r" b="b"/>
+              <a:pathLst>
+                <a:path w="6859500" h="6859500">
+                  <a:moveTo>
+                    <a:pt x="4053340" y="6235893"/>
+                  </a:moveTo>
+                  <a:lnTo>
+                    <a:pt x="4053340" y="4053340"/>
+                  </a:lnTo>
+                  <a:lnTo>
+                    <a:pt x="6235893" y="4053340"/>
+                  </a:lnTo>
+                  <a:cubicBezTo>
+                    <a:pt x="6580293" y="4053340"/>
+                    <a:pt x="6859501" y="3774132"/>
+                    <a:pt x="6859501" y="3429731"/>
+                  </a:cubicBezTo>
+                  <a:cubicBezTo>
+                    <a:pt x="6859501" y="3085330"/>
+                    <a:pt x="6580332" y="2806123"/>
+                    <a:pt x="6235893" y="2806123"/>
+                  </a:cubicBezTo>
+                  <a:lnTo>
+                    <a:pt x="4053340" y="2806123"/>
+                  </a:lnTo>
+                  <a:lnTo>
+                    <a:pt x="4053340" y="623608"/>
+                  </a:lnTo>
+                  <a:cubicBezTo>
+                    <a:pt x="4053340" y="279208"/>
+                    <a:pt x="3774171" y="0"/>
+                    <a:pt x="3429731" y="0"/>
+                  </a:cubicBezTo>
+                  <a:cubicBezTo>
+                    <a:pt x="3085330" y="0"/>
+                    <a:pt x="2806123" y="279208"/>
+                    <a:pt x="2806123" y="623608"/>
+                  </a:cubicBezTo>
+                  <a:lnTo>
+                    <a:pt x="2806123" y="2806161"/>
+                  </a:lnTo>
+                  <a:lnTo>
+                    <a:pt x="623608" y="2806161"/>
+                  </a:lnTo>
+                  <a:cubicBezTo>
+                    <a:pt x="279208" y="2806161"/>
+                    <a:pt x="0" y="3085369"/>
+                    <a:pt x="0" y="3429731"/>
+                  </a:cubicBezTo>
+                  <a:cubicBezTo>
+                    <a:pt x="0" y="3774132"/>
+                    <a:pt x="279208" y="4053340"/>
+                    <a:pt x="623608" y="4053340"/>
+                  </a:cubicBezTo>
+                  <a:lnTo>
+                    <a:pt x="2806161" y="4053340"/>
+                  </a:lnTo>
+                  <a:lnTo>
+                    <a:pt x="2806161" y="6235893"/>
+                  </a:lnTo>
+                  <a:cubicBezTo>
+                    <a:pt x="2806161" y="6580293"/>
+                    <a:pt x="3085369" y="6859501"/>
+                    <a:pt x="3429770" y="6859501"/>
+                  </a:cubicBezTo>
+                  <a:cubicBezTo>
+                    <a:pt x="3774171" y="6859501"/>
+                    <a:pt x="4053340" y="6580293"/>
+                    <a:pt x="4053340" y="6235893"/>
+                  </a:cubicBezTo>
+                  <a:close/>
+                </a:path>
+              </a:pathLst>
+            </a:custGeom>
+            <a:ln w="3848" cap="flat">
+              <a:noFill/>
+              <a:prstDash val="solid"/>
+              <a:miter/>
+            </a:ln>
+            <a:effectLst>
+              <a:glow rad="152400">
+                <a:srgbClr val="000000">
+                  <a:alpha val="4000"/>
+                </a:srgbClr>
+              </a:glow>
+              <a:outerShdw blurRad="101600" dist="38100" dir="16200000" rotWithShape="0">
+                <a:srgbClr val="000000">
+                  <a:alpha val="5000"/>
+                </a:srgbClr>
+              </a:outerShdw>
+            </a:effectLst>
+          </p:spPr>
+          <p:txBody>
+            <a:bodyPr rtlCol="0" anchor="ctr"/>
+            <a:lstStyle/>
+            <a:p>
+              <a:endParaRPr lang="en-US" dirty="0"/>
+            </a:p>
+          </p:txBody>
+        </p:sp>
+        <p:sp useBgFill="1">
+          <p:nvSpPr>
+            <p:cNvPr id="99" name="Oval 98">
+              <a:extLst>
+                <a:ext uri="{FF2B5EF4-FFF2-40B4-BE49-F238E27FC236}">
+                  <a16:creationId xmlns:a16="http://schemas.microsoft.com/office/drawing/2014/main" id="{23CA1A51-8DB4-445D-8FE3-498DB75CA588}"/>
+                </a:ext>
+                <a:ext uri="{C183D7F6-B498-43B3-948B-1728B52AA6E4}">
+                  <adec:decorative xmlns:adec="http://schemas.microsoft.com/office/drawing/2017/decorative" val="1"/>
+                </a:ext>
+              </a:extLst>
+            </p:cNvPr>
+            <p:cNvSpPr/>
+            <p:nvPr>
+              <p:extLst>
+                <p:ext uri="{386F3935-93C4-4BCD-93E2-E3B085C9AB24}">
+                  <p16:designElem xmlns:p16="http://schemas.microsoft.com/office/powerpoint/2015/main" val="1"/>
+                </p:ext>
+              </p:extLst>
+            </p:nvPr>
+          </p:nvSpPr>
+          <p:spPr>
+            <a:xfrm rot="10800000">
+              <a:off x="1815651" y="1342540"/>
+              <a:ext cx="215724" cy="215724"/>
+            </a:xfrm>
+            <a:prstGeom prst="ellipse">
+              <a:avLst/>
+            </a:prstGeom>
+            <a:ln w="3848" cap="flat">
+              <a:noFill/>
+              <a:prstDash val="solid"/>
+              <a:miter/>
+            </a:ln>
+            <a:effectLst>
+              <a:glow rad="152400">
+                <a:srgbClr val="000000">
+                  <a:alpha val="4000"/>
+                </a:srgbClr>
+              </a:glow>
+              <a:outerShdw blurRad="101600" dist="38100" dir="16200000" rotWithShape="0">
+                <a:srgbClr val="000000">
+                  <a:alpha val="5000"/>
+                </a:srgbClr>
+              </a:outerShdw>
+            </a:effectLst>
+          </p:spPr>
+          <p:txBody>
+            <a:bodyPr rtlCol="0" anchor="ctr"/>
+            <a:lstStyle/>
+            <a:p>
+              <a:endParaRPr lang="en-US" dirty="0"/>
+            </a:p>
+          </p:txBody>
+        </p:sp>
+        <p:sp useBgFill="1">
+          <p:nvSpPr>
+            <p:cNvPr id="100" name="Oval 99">
+              <a:extLst>
+                <a:ext uri="{FF2B5EF4-FFF2-40B4-BE49-F238E27FC236}">
+                  <a16:creationId xmlns:a16="http://schemas.microsoft.com/office/drawing/2014/main" id="{75DDD5AB-14AC-434C-95CC-18B81FAD36B9}"/>
+                </a:ext>
+                <a:ext uri="{C183D7F6-B498-43B3-948B-1728B52AA6E4}">
+                  <adec:decorative xmlns:adec="http://schemas.microsoft.com/office/drawing/2017/decorative" val="1"/>
+                </a:ext>
+              </a:extLst>
+            </p:cNvPr>
+            <p:cNvSpPr/>
+            <p:nvPr>
+              <p:extLst>
+                <p:ext uri="{386F3935-93C4-4BCD-93E2-E3B085C9AB24}">
+                  <p16:designElem xmlns:p16="http://schemas.microsoft.com/office/powerpoint/2015/main" val="1"/>
+                </p:ext>
+              </p:extLst>
+            </p:nvPr>
+          </p:nvSpPr>
+          <p:spPr>
+            <a:xfrm rot="10800000">
+              <a:off x="183404" y="225822"/>
+              <a:ext cx="474023" cy="474023"/>
+            </a:xfrm>
+            <a:prstGeom prst="ellipse">
+              <a:avLst/>
+            </a:prstGeom>
+            <a:ln w="3848" cap="flat">
+              <a:noFill/>
+              <a:prstDash val="solid"/>
+              <a:miter/>
+            </a:ln>
+            <a:effectLst>
+              <a:glow rad="152400">
+                <a:srgbClr val="000000">
+                  <a:alpha val="4000"/>
+                </a:srgbClr>
+              </a:glow>
+              <a:outerShdw blurRad="101600" dist="38100" dir="16200000" rotWithShape="0">
+                <a:srgbClr val="000000">
+                  <a:alpha val="5000"/>
+                </a:srgbClr>
+              </a:outerShdw>
+            </a:effectLst>
+          </p:spPr>
+          <p:txBody>
+            <a:bodyPr rtlCol="0" anchor="ctr"/>
+            <a:lstStyle/>
+            <a:p>
+              <a:endParaRPr lang="en-US"/>
+            </a:p>
+          </p:txBody>
+        </p:sp>
+        <p:sp useBgFill="1">
+          <p:nvSpPr>
+            <p:cNvPr id="101" name="Oval 100">
+              <a:extLst>
+                <a:ext uri="{FF2B5EF4-FFF2-40B4-BE49-F238E27FC236}">
+                  <a16:creationId xmlns:a16="http://schemas.microsoft.com/office/drawing/2014/main" id="{673FC915-211E-480B-8EC6-9659D9FCA15F}"/>
+                </a:ext>
+                <a:ext uri="{C183D7F6-B498-43B3-948B-1728B52AA6E4}">
+                  <adec:decorative xmlns:adec="http://schemas.microsoft.com/office/drawing/2017/decorative" val="1"/>
+                </a:ext>
+              </a:extLst>
+            </p:cNvPr>
+            <p:cNvSpPr/>
+            <p:nvPr>
+              <p:extLst>
+                <p:ext uri="{386F3935-93C4-4BCD-93E2-E3B085C9AB24}">
+                  <p16:designElem xmlns:p16="http://schemas.microsoft.com/office/powerpoint/2015/main" val="1"/>
+                </p:ext>
+              </p:extLst>
+            </p:nvPr>
+          </p:nvSpPr>
+          <p:spPr>
+            <a:xfrm rot="10800000">
+              <a:off x="583574" y="2333139"/>
+              <a:ext cx="330825" cy="330825"/>
+            </a:xfrm>
+            <a:prstGeom prst="ellipse">
+              <a:avLst/>
+            </a:prstGeom>
+            <a:ln w="3848" cap="flat">
+              <a:noFill/>
+              <a:prstDash val="solid"/>
+              <a:miter/>
+            </a:ln>
+            <a:effectLst>
+              <a:glow rad="152400">
+                <a:srgbClr val="000000">
+                  <a:alpha val="4000"/>
+                </a:srgbClr>
+              </a:glow>
+              <a:outerShdw blurRad="101600" dist="38100" dir="16200000" rotWithShape="0">
+                <a:srgbClr val="000000">
+                  <a:alpha val="5000"/>
+                </a:srgbClr>
+              </a:outerShdw>
+            </a:effectLst>
+          </p:spPr>
+          <p:txBody>
+            <a:bodyPr rtlCol="0" anchor="ctr"/>
+            <a:lstStyle/>
+            <a:p>
+              <a:endParaRPr lang="en-US" dirty="0"/>
+            </a:p>
+          </p:txBody>
+        </p:sp>
+      </p:grpSp>
+      <p:sp>
+        <p:nvSpPr>
+          <p:cNvPr id="103" name="Rectangle 102">
+            <a:extLst>
+              <a:ext uri="{FF2B5EF4-FFF2-40B4-BE49-F238E27FC236}">
+                <a16:creationId xmlns:a16="http://schemas.microsoft.com/office/drawing/2014/main" id="{EA80DA9C-57E0-4991-B11A-51E132563976}"/>
+              </a:ext>
+              <a:ext uri="{C183D7F6-B498-43B3-948B-1728B52AA6E4}">
+                <adec:decorative xmlns:adec="http://schemas.microsoft.com/office/drawing/2017/decorative" val="1"/>
+              </a:ext>
+            </a:extLst>
+          </p:cNvPr>
+          <p:cNvSpPr>
+            <a:spLocks noGrp="1" noRot="1" noChangeAspect="1" noMove="1" noResize="1" noEditPoints="1" noAdjustHandles="1" noChangeArrowheads="1" noChangeShapeType="1" noTextEdit="1"/>
+          </p:cNvSpPr>
+          <p:nvPr>
+            <p:extLst>
+              <p:ext uri="{386F3935-93C4-4BCD-93E2-E3B085C9AB24}">
+                <p16:designElem xmlns:p16="http://schemas.microsoft.com/office/powerpoint/2015/main" val="1"/>
+              </p:ext>
+            </p:extLst>
+          </p:nvPr>
+        </p:nvSpPr>
+        <p:spPr>
+          <a:xfrm>
+            <a:off x="0" y="0"/>
+            <a:ext cx="12192000" cy="6858000"/>
+          </a:xfrm>
+          <a:prstGeom prst="rect">
+            <a:avLst/>
+          </a:prstGeom>
+          <a:solidFill>
+            <a:schemeClr val="accent2">
+              <a:alpha val="40000"/>
+            </a:schemeClr>
+          </a:solidFill>
+          <a:ln w="3848" cap="flat">
+            <a:noFill/>
+            <a:prstDash val="solid"/>
+            <a:miter/>
+          </a:ln>
+          <a:effectLst/>
+        </p:spPr>
+        <p:txBody>
+          <a:bodyPr rtlCol="0" anchor="ctr"/>
+          <a:lstStyle/>
+          <a:p>
+            <a:endParaRPr lang="en-US" dirty="0">
+              <a:solidFill>
+                <a:schemeClr val="tx1"/>
+              </a:solidFill>
+            </a:endParaRPr>
+          </a:p>
+        </p:txBody>
+      </p:sp>
+      <p:sp>
+        <p:nvSpPr>
+          <p:cNvPr id="4" name="Titel 1">
+            <a:extLst>
+              <a:ext uri="{FF2B5EF4-FFF2-40B4-BE49-F238E27FC236}">
+                <a16:creationId xmlns:a16="http://schemas.microsoft.com/office/drawing/2014/main" id="{B08AE3A3-6D96-96A1-00AF-04796FD7D1C8}"/>
+              </a:ext>
+            </a:extLst>
+          </p:cNvPr>
+          <p:cNvSpPr txBox="1">
+            <a:spLocks/>
+          </p:cNvSpPr>
+          <p:nvPr/>
+        </p:nvSpPr>
+        <p:spPr>
+          <a:xfrm>
+            <a:off x="822352" y="566126"/>
+            <a:ext cx="10531448" cy="2210521"/>
+          </a:xfrm>
+          <a:prstGeom prst="rect">
+            <a:avLst/>
+          </a:prstGeom>
+        </p:spPr>
+        <p:txBody>
+          <a:bodyPr vert="horz" lIns="91440" tIns="45720" rIns="91440" bIns="45720" rtlCol="0" anchor="b">
+            <a:normAutofit/>
+          </a:bodyPr>
+          <a:lstStyle>
+            <a:lvl1pPr algn="l" defTabSz="914400" rtl="0" eaLnBrk="1" latinLnBrk="0" hangingPunct="1">
+              <a:lnSpc>
+                <a:spcPct val="90000"/>
+              </a:lnSpc>
+              <a:spcBef>
+                <a:spcPct val="0"/>
+              </a:spcBef>
+              <a:buNone/>
+              <a:defRPr sz="4400" kern="1200">
+                <a:solidFill>
+                  <a:schemeClr val="tx1"/>
+                </a:solidFill>
+                <a:latin typeface="+mj-lt"/>
+                <a:ea typeface="+mj-ea"/>
+                <a:cs typeface="+mj-cs"/>
+              </a:defRPr>
+            </a:lvl1pPr>
+          </a:lstStyle>
+          <a:p>
+            <a:pPr algn="ctr">
+              <a:spcAft>
+                <a:spcPts val="600"/>
+              </a:spcAft>
+            </a:pPr>
+            <a:r>
+              <a:rPr lang="en-US" kern="1200">
+                <a:solidFill>
+                  <a:srgbClr val="FFFFFF"/>
+                </a:solidFill>
+                <a:latin typeface="+mj-lt"/>
+                <a:ea typeface="+mj-ea"/>
+                <a:cs typeface="+mj-cs"/>
+              </a:rPr>
+              <a:t>Kostenkalkulation</a:t>
+            </a:r>
+          </a:p>
+        </p:txBody>
+      </p:sp>
+      <mc:AlternateContent xmlns:mc="http://schemas.openxmlformats.org/markup-compatibility/2006">
+        <mc:Choice xmlns:a14="http://schemas.microsoft.com/office/drawing/2010/main" Requires="a14">
+          <p:sp>
+            <p:nvSpPr>
+              <p:cNvPr id="8" name="Inhaltsplatzhalter 2">
+                <a:extLst>
+                  <a:ext uri="{FF2B5EF4-FFF2-40B4-BE49-F238E27FC236}">
+                    <a16:creationId xmlns:a16="http://schemas.microsoft.com/office/drawing/2014/main" id="{47CA121A-D830-C7A8-3223-FC60D0E35A07}"/>
+                  </a:ext>
+                </a:extLst>
+              </p:cNvPr>
+              <p:cNvSpPr>
+                <a:spLocks noGrp="1"/>
+              </p:cNvSpPr>
+              <p:nvPr>
+                <p:ph idx="1"/>
+              </p:nvPr>
+            </p:nvSpPr>
+            <p:spPr>
+              <a:xfrm>
+                <a:off x="83858" y="2856075"/>
+                <a:ext cx="6191470" cy="3176250"/>
+              </a:xfrm>
+            </p:spPr>
+            <p:txBody>
+              <a:bodyPr vert="horz" lIns="91440" tIns="45720" rIns="91440" bIns="45720" rtlCol="0" anchor="t">
+                <a:normAutofit/>
+              </a:bodyPr>
+              <a:lstStyle/>
+              <a:p>
+                <a:pPr algn="ctr"/>
+                <a:r>
+                  <a:rPr lang="en-US" sz="1800" b="0" i="1" dirty="0">
+                    <a:solidFill>
+                      <a:srgbClr val="FFFFFF"/>
+                    </a:solidFill>
+                  </a:rPr>
+                  <a:t>2 Mitarbeiter</a:t>
+                </a:r>
+              </a:p>
+              <a:p>
+                <a:pPr algn="ctr"/>
+                <a:r>
+                  <a:rPr lang="en-US" sz="1800" i="1" dirty="0">
+                    <a:solidFill>
+                      <a:srgbClr val="FFFFFF"/>
+                    </a:solidFill>
+                  </a:rPr>
+                  <a:t>10€ </a:t>
+                </a:r>
+                <a:r>
+                  <a:rPr lang="en-US" sz="1800" i="1" dirty="0" err="1">
+                    <a:solidFill>
+                      <a:srgbClr val="FFFFFF"/>
+                    </a:solidFill>
+                  </a:rPr>
+                  <a:t>Stundenlohn</a:t>
+                </a:r>
+                <a:endParaRPr lang="en-US" sz="1800" i="1" dirty="0">
+                  <a:solidFill>
+                    <a:srgbClr val="FFFFFF"/>
+                  </a:solidFill>
+                </a:endParaRPr>
+              </a:p>
+              <a:p>
+                <a:pPr algn="ctr"/>
+                <a:r>
+                  <a:rPr lang="en-US" sz="1800" b="0" i="1" dirty="0">
+                    <a:solidFill>
+                      <a:srgbClr val="FFFFFF"/>
+                    </a:solidFill>
+                  </a:rPr>
+                  <a:t>16h </a:t>
+                </a:r>
+                <a:r>
+                  <a:rPr lang="en-US" sz="1800" b="0" i="1" dirty="0" err="1">
+                    <a:solidFill>
+                      <a:srgbClr val="FFFFFF"/>
+                    </a:solidFill>
+                  </a:rPr>
+                  <a:t>Arbeitszeit</a:t>
+                </a:r>
+                <a:endParaRPr lang="en-US" sz="1800" b="0" i="1" dirty="0">
+                  <a:solidFill>
+                    <a:srgbClr val="FFFFFF"/>
+                  </a:solidFill>
+                </a:endParaRPr>
+              </a:p>
+              <a:p>
+                <a:pPr algn="ctr"/>
+                <a:r>
+                  <a:rPr lang="en-US" sz="1800" i="1" dirty="0">
+                    <a:solidFill>
+                      <a:srgbClr val="FFFFFF"/>
+                    </a:solidFill>
+                  </a:rPr>
+                  <a:t>100€ </a:t>
+                </a:r>
+                <a:r>
+                  <a:rPr lang="en-US" sz="1800" i="1" dirty="0" err="1">
+                    <a:solidFill>
+                      <a:srgbClr val="FFFFFF"/>
+                    </a:solidFill>
+                  </a:rPr>
+                  <a:t>Fixkosten</a:t>
+                </a:r>
+                <a:endParaRPr lang="en-US" sz="1800" b="0" i="1" dirty="0">
+                  <a:solidFill>
+                    <a:srgbClr val="FFFFFF"/>
+                  </a:solidFill>
+                </a:endParaRPr>
+              </a:p>
+              <a:p>
+                <a:pPr algn="ctr"/>
+                <a:endParaRPr lang="en-US" sz="1800" b="0" i="1" dirty="0">
+                  <a:solidFill>
+                    <a:srgbClr val="FFFFFF"/>
+                  </a:solidFill>
+                </a:endParaRPr>
+              </a:p>
+              <a:p>
+                <a:pPr algn="ctr"/>
+                <a14:m>
+                  <m:oMath xmlns:m="http://schemas.openxmlformats.org/officeDocument/2006/math">
+                    <m:r>
+                      <a:rPr lang="en-US" sz="1800" b="0" i="1">
+                        <a:solidFill>
+                          <a:srgbClr val="FFFFFF"/>
+                        </a:solidFill>
+                        <a:latin typeface="Cambria Math" panose="02040503050406030204" pitchFamily="18" charset="0"/>
+                      </a:rPr>
+                      <m:t>2 ∗</m:t>
+                    </m:r>
+                    <m:d>
+                      <m:dPr>
+                        <m:ctrlPr>
+                          <a:rPr lang="en-US" sz="1800" b="0" i="1">
+                            <a:solidFill>
+                              <a:srgbClr val="FFFFFF"/>
+                            </a:solidFill>
+                            <a:latin typeface="Cambria Math" panose="02040503050406030204" pitchFamily="18" charset="0"/>
+                          </a:rPr>
+                        </m:ctrlPr>
+                      </m:dPr>
+                      <m:e>
+                        <m:r>
+                          <a:rPr lang="en-US" sz="1800" b="0" i="1">
+                            <a:solidFill>
+                              <a:srgbClr val="FFFFFF"/>
+                            </a:solidFill>
+                            <a:latin typeface="Cambria Math" panose="02040503050406030204" pitchFamily="18" charset="0"/>
+                          </a:rPr>
+                          <m:t>16</m:t>
+                        </m:r>
+                        <m:r>
+                          <a:rPr lang="en-US" sz="1800" b="0" i="1">
+                            <a:solidFill>
+                              <a:srgbClr val="FFFFFF"/>
+                            </a:solidFill>
+                            <a:latin typeface="Cambria Math" panose="02040503050406030204" pitchFamily="18" charset="0"/>
+                          </a:rPr>
+                          <m:t>h</m:t>
+                        </m:r>
+                        <m:r>
+                          <a:rPr lang="en-US" sz="1800" b="0" i="1">
+                            <a:solidFill>
+                              <a:srgbClr val="FFFFFF"/>
+                            </a:solidFill>
+                            <a:latin typeface="Cambria Math" panose="02040503050406030204" pitchFamily="18" charset="0"/>
+                          </a:rPr>
+                          <m:t>∗10€</m:t>
+                        </m:r>
+                      </m:e>
+                    </m:d>
+                    <m:r>
+                      <a:rPr lang="en-US" sz="1800" b="0" i="1">
+                        <a:solidFill>
+                          <a:srgbClr val="FFFFFF"/>
+                        </a:solidFill>
+                        <a:latin typeface="Cambria Math" panose="02040503050406030204" pitchFamily="18" charset="0"/>
+                      </a:rPr>
+                      <m:t>+50€=420€</m:t>
+                    </m:r>
+                  </m:oMath>
+                </a14:m>
+                <a:endParaRPr lang="en-US" sz="1800" dirty="0">
+                  <a:solidFill>
+                    <a:srgbClr val="FFFFFF"/>
+                  </a:solidFill>
+                </a:endParaRPr>
+              </a:p>
+            </p:txBody>
+          </p:sp>
+        </mc:Choice>
+        <mc:Fallback>
+          <p:sp>
+            <p:nvSpPr>
+              <p:cNvPr id="8" name="Inhaltsplatzhalter 2">
+                <a:extLst>
+                  <a:ext uri="{FF2B5EF4-FFF2-40B4-BE49-F238E27FC236}">
+                    <a16:creationId xmlns:a16="http://schemas.microsoft.com/office/drawing/2014/main" id="{47CA121A-D830-C7A8-3223-FC60D0E35A07}"/>
+                  </a:ext>
+                </a:extLst>
+              </p:cNvPr>
+              <p:cNvSpPr>
+                <a:spLocks noGrp="1" noRot="1" noChangeAspect="1" noMove="1" noResize="1" noEditPoints="1" noAdjustHandles="1" noChangeArrowheads="1" noChangeShapeType="1" noTextEdit="1"/>
+              </p:cNvSpPr>
+              <p:nvPr>
+                <p:ph idx="1"/>
+              </p:nvPr>
+            </p:nvSpPr>
+            <p:spPr>
+              <a:xfrm>
+                <a:off x="83858" y="2856075"/>
+                <a:ext cx="6191470" cy="3176250"/>
+              </a:xfrm>
+              <a:blipFill>
+                <a:blip r:embed="rId3"/>
+                <a:stretch>
+                  <a:fillRect t="-3071"/>
+                </a:stretch>
+              </a:blipFill>
+            </p:spPr>
+            <p:txBody>
+              <a:bodyPr/>
+              <a:lstStyle/>
+              <a:p>
+                <a:r>
+                  <a:rPr lang="de-DE">
+                    <a:noFill/>
+                  </a:rPr>
+                  <a:t> </a:t>
+                </a:r>
+              </a:p>
+            </p:txBody>
+          </p:sp>
+        </mc:Fallback>
+      </mc:AlternateContent>
+      <mc:AlternateContent xmlns:mc="http://schemas.openxmlformats.org/markup-compatibility/2006">
+        <mc:Choice xmlns:a14="http://schemas.microsoft.com/office/drawing/2010/main" Requires="a14">
+          <p:sp>
+            <p:nvSpPr>
+              <p:cNvPr id="14" name="Textfeld 13">
+                <a:extLst>
+                  <a:ext uri="{FF2B5EF4-FFF2-40B4-BE49-F238E27FC236}">
+                    <a16:creationId xmlns:a16="http://schemas.microsoft.com/office/drawing/2014/main" id="{DE63776B-D1A2-ED5D-5F21-AE958F8A2FDD}"/>
+                  </a:ext>
+                </a:extLst>
+              </p:cNvPr>
+              <p:cNvSpPr txBox="1"/>
+              <p:nvPr/>
+            </p:nvSpPr>
+            <p:spPr>
+              <a:xfrm>
+                <a:off x="6442974" y="2789420"/>
+                <a:ext cx="5065776" cy="2985946"/>
+              </a:xfrm>
+              <a:prstGeom prst="rect">
+                <a:avLst/>
+              </a:prstGeom>
+              <a:noFill/>
+            </p:spPr>
+            <p:txBody>
+              <a:bodyPr wrap="square" rtlCol="0">
+                <a:spAutoFit/>
+              </a:bodyPr>
+              <a:lstStyle/>
+              <a:p>
+                <a:r>
+                  <a:rPr lang="de-DE" dirty="0">
+                    <a:solidFill>
+                      <a:schemeClr val="bg1"/>
+                    </a:solidFill>
+                  </a:rPr>
+                  <a:t>Finanzierung durch Werbung</a:t>
+                </a:r>
+              </a:p>
+              <a:p>
+                <a:endParaRPr lang="de-DE" dirty="0">
+                  <a:solidFill>
+                    <a:schemeClr val="bg1"/>
+                  </a:solidFill>
+                </a:endParaRPr>
+              </a:p>
+              <a:p>
+                <a:r>
+                  <a:rPr lang="de-DE" dirty="0">
+                    <a:solidFill>
+                      <a:schemeClr val="bg1"/>
+                    </a:solidFill>
+                  </a:rPr>
+                  <a:t>Pro Seiten Aufruf 0,05€</a:t>
+                </a:r>
+              </a:p>
+              <a:p>
+                <a:r>
+                  <a:rPr lang="de-DE" dirty="0">
+                    <a:solidFill>
+                      <a:schemeClr val="bg1"/>
+                    </a:solidFill>
+                  </a:rPr>
+                  <a:t>Geschätzter Traffic pro Monat 3740</a:t>
+                </a:r>
+              </a:p>
+              <a:p>
+                <a:endParaRPr lang="de-DE" dirty="0">
+                  <a:solidFill>
+                    <a:schemeClr val="bg1"/>
+                  </a:solidFill>
+                </a:endParaRPr>
+              </a:p>
+              <a:p>
+                <a:pPr/>
+                <a14:m>
+                  <m:oMathPara xmlns:m="http://schemas.openxmlformats.org/officeDocument/2006/math">
+                    <m:oMathParaPr>
+                      <m:jc m:val="left"/>
+                    </m:oMathParaPr>
+                    <m:oMath xmlns:m="http://schemas.openxmlformats.org/officeDocument/2006/math">
+                      <m:r>
+                        <a:rPr lang="de-DE" i="1" smtClean="0">
+                          <a:solidFill>
+                            <a:schemeClr val="bg1"/>
+                          </a:solidFill>
+                          <a:latin typeface="Cambria Math" panose="02040503050406030204" pitchFamily="18" charset="0"/>
+                        </a:rPr>
+                        <m:t>3</m:t>
+                      </m:r>
+                      <m:r>
+                        <a:rPr lang="de-DE" b="0" i="1" smtClean="0">
+                          <a:solidFill>
+                            <a:schemeClr val="bg1"/>
+                          </a:solidFill>
+                          <a:latin typeface="Cambria Math" panose="02040503050406030204" pitchFamily="18" charset="0"/>
+                        </a:rPr>
+                        <m:t>740 ∗0,05€=187€</m:t>
+                      </m:r>
+                    </m:oMath>
+                  </m:oMathPara>
+                </a14:m>
+                <a:endParaRPr lang="de-DE" dirty="0">
+                  <a:solidFill>
+                    <a:schemeClr val="bg1"/>
+                  </a:solidFill>
+                </a:endParaRPr>
+              </a:p>
+              <a:p>
+                <a:endParaRPr lang="de-DE" dirty="0">
+                  <a:solidFill>
+                    <a:schemeClr val="bg1"/>
+                  </a:solidFill>
+                </a:endParaRPr>
+              </a:p>
+              <a:p>
+                <a:r>
+                  <a:rPr lang="de-DE" dirty="0">
+                    <a:solidFill>
+                      <a:schemeClr val="bg1"/>
+                    </a:solidFill>
+                  </a:rPr>
+                  <a:t>Amortisation:</a:t>
+                </a:r>
+              </a:p>
+              <a:p>
+                <a:br>
+                  <a:rPr lang="de-DE" dirty="0">
+                    <a:solidFill>
+                      <a:schemeClr val="bg1"/>
+                    </a:solidFill>
+                  </a:rPr>
+                </a:br>
+                <a14:m>
+                  <m:oMath xmlns:m="http://schemas.openxmlformats.org/officeDocument/2006/math">
+                    <m:f>
+                      <m:fPr>
+                        <m:ctrlPr>
+                          <a:rPr lang="de-DE" b="0" i="1" smtClean="0">
+                            <a:solidFill>
+                              <a:schemeClr val="bg1"/>
+                            </a:solidFill>
+                            <a:latin typeface="Cambria Math" panose="02040503050406030204" pitchFamily="18" charset="0"/>
+                          </a:rPr>
+                        </m:ctrlPr>
+                      </m:fPr>
+                      <m:num>
+                        <m:r>
+                          <a:rPr lang="de-DE" b="0" i="1" smtClean="0">
+                            <a:solidFill>
+                              <a:schemeClr val="bg1"/>
+                            </a:solidFill>
+                            <a:latin typeface="Cambria Math" panose="02040503050406030204" pitchFamily="18" charset="0"/>
+                          </a:rPr>
+                          <m:t>420€</m:t>
+                        </m:r>
+                      </m:num>
+                      <m:den>
+                        <m:r>
+                          <a:rPr lang="de-DE" b="0" i="1" smtClean="0">
+                            <a:solidFill>
+                              <a:schemeClr val="bg1"/>
+                            </a:solidFill>
+                            <a:latin typeface="Cambria Math" panose="02040503050406030204" pitchFamily="18" charset="0"/>
+                          </a:rPr>
+                          <m:t>187€</m:t>
+                        </m:r>
+                      </m:den>
+                    </m:f>
+                    <m:r>
+                      <a:rPr lang="de-DE" b="0" i="1" smtClean="0">
+                        <a:solidFill>
+                          <a:schemeClr val="bg1"/>
+                        </a:solidFill>
+                        <a:latin typeface="Cambria Math" panose="02040503050406030204" pitchFamily="18" charset="0"/>
+                      </a:rPr>
+                      <m:t>=2,25</m:t>
+                    </m:r>
+                  </m:oMath>
+                </a14:m>
+                <a:r>
+                  <a:rPr lang="de-DE" dirty="0">
+                    <a:solidFill>
+                      <a:schemeClr val="bg1"/>
+                    </a:solidFill>
+                  </a:rPr>
+                  <a:t> Monate</a:t>
+                </a:r>
+              </a:p>
+            </p:txBody>
+          </p:sp>
+        </mc:Choice>
+        <mc:Fallback>
+          <p:sp>
+            <p:nvSpPr>
+              <p:cNvPr id="14" name="Textfeld 13">
+                <a:extLst>
+                  <a:ext uri="{FF2B5EF4-FFF2-40B4-BE49-F238E27FC236}">
+                    <a16:creationId xmlns:a16="http://schemas.microsoft.com/office/drawing/2014/main" id="{DE63776B-D1A2-ED5D-5F21-AE958F8A2FDD}"/>
+                  </a:ext>
+                </a:extLst>
+              </p:cNvPr>
+              <p:cNvSpPr txBox="1">
+                <a:spLocks noRot="1" noChangeAspect="1" noMove="1" noResize="1" noEditPoints="1" noAdjustHandles="1" noChangeArrowheads="1" noChangeShapeType="1" noTextEdit="1"/>
+              </p:cNvSpPr>
+              <p:nvPr/>
+            </p:nvSpPr>
+            <p:spPr>
+              <a:xfrm>
+                <a:off x="6442974" y="2789420"/>
+                <a:ext cx="5065776" cy="2985946"/>
+              </a:xfrm>
+              <a:prstGeom prst="rect">
+                <a:avLst/>
+              </a:prstGeom>
+              <a:blipFill>
+                <a:blip r:embed="rId4"/>
+                <a:stretch>
+                  <a:fillRect l="-1083" t="-1227" b="-613"/>
+                </a:stretch>
+              </a:blipFill>
+            </p:spPr>
+            <p:txBody>
+              <a:bodyPr/>
+              <a:lstStyle/>
+              <a:p>
+                <a:r>
+                  <a:rPr lang="de-DE">
+                    <a:noFill/>
+                  </a:rPr>
+                  <a:t> </a:t>
+                </a:r>
+              </a:p>
+            </p:txBody>
+          </p:sp>
+        </mc:Fallback>
+      </mc:AlternateContent>
+    </p:spTree>
+    <p:extLst>
+      <p:ext uri="{BB962C8B-B14F-4D97-AF65-F5344CB8AC3E}">
+        <p14:creationId xmlns:p14="http://schemas.microsoft.com/office/powerpoint/2010/main" val="1768042935"/>
+      </p:ext>
+    </p:extLst>
+  </p:cSld>
+  <p:clrMapOvr>
+    <a:masterClrMapping/>
+  </p:clrMapOvr>
+</p:sld>
+</file>
+
+<file path=ppt/slides/slide4.xml><?xml version="1.0" encoding="utf-8"?>
+<p:sld xmlns:a="http://schemas.openxmlformats.org/drawingml/2006/main" xmlns:r="http://schemas.openxmlformats.org/officeDocument/2006/relationships" xmlns:p="http://schemas.openxmlformats.org/presentationml/2006/main">
+  <p:cSld>
+    <p:bg>
+      <p:bgPr>
+        <a:solidFill>
+          <a:schemeClr val="bg1"/>
+        </a:solidFill>
+        <a:effectLst/>
+      </p:bgPr>
+    </p:bg>
+    <p:spTree>
+      <p:nvGrpSpPr>
+        <p:cNvPr id="1" name=""/>
+        <p:cNvGrpSpPr/>
+        <p:nvPr/>
+      </p:nvGrpSpPr>
+      <p:grpSpPr>
+        <a:xfrm>
+          <a:off x="0" y="0"/>
+          <a:ext cx="0" cy="0"/>
+          <a:chOff x="0" y="0"/>
+          <a:chExt cx="0" cy="0"/>
+        </a:xfrm>
+      </p:grpSpPr>
+      <p:sp useBgFill="1">
+        <p:nvSpPr>
+          <p:cNvPr id="60" name="Rectangle 59">
+            <a:extLst>
+              <a:ext uri="{FF2B5EF4-FFF2-40B4-BE49-F238E27FC236}">
+                <a16:creationId xmlns:a16="http://schemas.microsoft.com/office/drawing/2014/main" id="{25AD4A59-91FA-4E30-8F32-A8AB51F768C6}"/>
+              </a:ext>
+              <a:ext uri="{C183D7F6-B498-43B3-948B-1728B52AA6E4}">
+                <adec:decorative xmlns:adec="http://schemas.microsoft.com/office/drawing/2017/decorative" val="1"/>
+              </a:ext>
+            </a:extLst>
+          </p:cNvPr>
+          <p:cNvSpPr>
+            <a:spLocks noGrp="1" noRot="1" noChangeAspect="1" noMove="1" noResize="1" noEditPoints="1" noAdjustHandles="1" noChangeArrowheads="1" noChangeShapeType="1" noTextEdit="1"/>
+          </p:cNvSpPr>
+          <p:nvPr>
+            <p:extLst>
+              <p:ext uri="{386F3935-93C4-4BCD-93E2-E3B085C9AB24}">
+                <p16:designElem xmlns:p16="http://schemas.microsoft.com/office/powerpoint/2015/main" val="1"/>
+              </p:ext>
+            </p:extLst>
+          </p:nvPr>
+        </p:nvSpPr>
+        <p:spPr>
+          <a:xfrm>
+            <a:off x="0" y="0"/>
+            <a:ext cx="12192000" cy="6858000"/>
+          </a:xfrm>
+          <a:prstGeom prst="rect">
+            <a:avLst/>
+          </a:prstGeom>
+          <a:ln w="3848" cap="flat">
+            <a:noFill/>
+            <a:prstDash val="solid"/>
+            <a:miter/>
+          </a:ln>
+          <a:effectLst/>
+        </p:spPr>
+        <p:txBody>
+          <a:bodyPr rtlCol="0" anchor="ctr"/>
+          <a:lstStyle/>
+          <a:p>
+            <a:endParaRPr lang="en-US" dirty="0">
+              <a:solidFill>
+                <a:schemeClr val="tx1"/>
+              </a:solidFill>
+            </a:endParaRPr>
+          </a:p>
+        </p:txBody>
+      </p:sp>
+      <p:sp>
+        <p:nvSpPr>
+          <p:cNvPr id="62" name="Rectangle 61">
+            <a:extLst>
+              <a:ext uri="{FF2B5EF4-FFF2-40B4-BE49-F238E27FC236}">
+                <a16:creationId xmlns:a16="http://schemas.microsoft.com/office/drawing/2014/main" id="{01AF26B4-1569-483F-8223-4C515A87A527}"/>
+              </a:ext>
+              <a:ext uri="{C183D7F6-B498-43B3-948B-1728B52AA6E4}">
+                <adec:decorative xmlns:adec="http://schemas.microsoft.com/office/drawing/2017/decorative" val="1"/>
+              </a:ext>
+            </a:extLst>
+          </p:cNvPr>
+          <p:cNvSpPr>
+            <a:spLocks noGrp="1" noRot="1" noChangeAspect="1" noMove="1" noResize="1" noEditPoints="1" noAdjustHandles="1" noChangeArrowheads="1" noChangeShapeType="1" noTextEdit="1"/>
+          </p:cNvSpPr>
+          <p:nvPr>
+            <p:extLst>
+              <p:ext uri="{386F3935-93C4-4BCD-93E2-E3B085C9AB24}">
+                <p16:designElem xmlns:p16="http://schemas.microsoft.com/office/powerpoint/2015/main" val="1"/>
+              </p:ext>
+            </p:extLst>
+          </p:nvPr>
+        </p:nvSpPr>
+        <p:spPr>
+          <a:xfrm>
+            <a:off x="0" y="0"/>
+            <a:ext cx="12192000" cy="6858000"/>
+          </a:xfrm>
+          <a:prstGeom prst="rect">
+            <a:avLst/>
+          </a:prstGeom>
+          <a:solidFill>
+            <a:srgbClr val="FFFFFF">
+              <a:alpha val="10000"/>
+            </a:srgbClr>
+          </a:solidFill>
+          <a:ln w="3848" cap="flat">
+            <a:noFill/>
+            <a:prstDash val="solid"/>
+            <a:miter/>
+          </a:ln>
+          <a:effectLst/>
+        </p:spPr>
+        <p:txBody>
+          <a:bodyPr rtlCol="0" anchor="ctr"/>
+          <a:lstStyle/>
+          <a:p>
+            <a:endParaRPr lang="en-US" dirty="0">
+              <a:solidFill>
+                <a:schemeClr val="tx1"/>
+              </a:solidFill>
+            </a:endParaRPr>
+          </a:p>
+        </p:txBody>
+      </p:sp>
+      <p:pic>
+        <p:nvPicPr>
+          <p:cNvPr id="25" name="Grafik 24" descr="Ein Bild, das Gebäude, Licht, Nacht enthält.&#10;&#10;Automatisch generierte Beschreibung">
+            <a:extLst>
+              <a:ext uri="{FF2B5EF4-FFF2-40B4-BE49-F238E27FC236}">
+                <a16:creationId xmlns:a16="http://schemas.microsoft.com/office/drawing/2014/main" id="{F233E30A-32ED-EE8E-D5A4-DD2CA1F922A0}"/>
+              </a:ext>
+            </a:extLst>
+          </p:cNvPr>
+          <p:cNvPicPr>
+            <a:picLocks noChangeAspect="1"/>
+          </p:cNvPicPr>
+          <p:nvPr/>
+        </p:nvPicPr>
+        <p:blipFill rotWithShape="1">
+          <a:blip r:embed="rId2">
+            <a:extLst>
+              <a:ext uri="{28A0092B-C50C-407E-A947-70E740481C1C}">
+                <a14:useLocalDpi xmlns:a14="http://schemas.microsoft.com/office/drawing/2010/main" val="0"/>
+              </a:ext>
+            </a:extLst>
+          </a:blip>
+          <a:srcRect l="25"/>
+          <a:stretch/>
+        </p:blipFill>
+        <p:spPr>
+          <a:xfrm>
+            <a:off x="-42776" y="-41983"/>
+            <a:ext cx="12277552" cy="6941966"/>
+          </a:xfrm>
+          <a:prstGeom prst="rect">
+            <a:avLst/>
+          </a:prstGeom>
+        </p:spPr>
+      </p:pic>
+      <p:grpSp>
+        <p:nvGrpSpPr>
+          <p:cNvPr id="64" name="Group 63">
+            <a:extLst>
+              <a:ext uri="{FF2B5EF4-FFF2-40B4-BE49-F238E27FC236}">
+                <a16:creationId xmlns:a16="http://schemas.microsoft.com/office/drawing/2014/main" id="{1AC8529D-DF13-4349-856C-DA81451848A7}"/>
+              </a:ext>
+              <a:ext uri="{C183D7F6-B498-43B3-948B-1728B52AA6E4}">
+                <adec:decorative xmlns:adec="http://schemas.microsoft.com/office/drawing/2017/decorative" val="1"/>
+              </a:ext>
+            </a:extLst>
+          </p:cNvPr>
+          <p:cNvGrpSpPr>
+            <a:grpSpLocks noGrp="1" noUngrp="1" noRot="1" noChangeAspect="1" noMove="1" noResize="1"/>
+          </p:cNvGrpSpPr>
+          <p:nvPr>
+            <p:extLst>
+              <p:ext uri="{386F3935-93C4-4BCD-93E2-E3B085C9AB24}">
+                <p16:designElem xmlns:p16="http://schemas.microsoft.com/office/powerpoint/2015/main" val="1"/>
+              </p:ext>
+            </p:extLst>
+          </p:nvPr>
+        </p:nvGrpSpPr>
+        <p:grpSpPr>
+          <a:xfrm>
+            <a:off x="183404" y="225822"/>
+            <a:ext cx="1847971" cy="2438142"/>
+            <a:chOff x="183404" y="225822"/>
+            <a:chExt cx="1847971" cy="2438142"/>
+          </a:xfrm>
+        </p:grpSpPr>
+        <p:sp useBgFill="1">
+          <p:nvSpPr>
+            <p:cNvPr id="65" name="Graphic 10">
+              <a:extLst>
+                <a:ext uri="{FF2B5EF4-FFF2-40B4-BE49-F238E27FC236}">
+                  <a16:creationId xmlns:a16="http://schemas.microsoft.com/office/drawing/2014/main" id="{23EB0175-B014-4375-9C83-BA3BC7588FC4}"/>
+                </a:ext>
+                <a:ext uri="{C183D7F6-B498-43B3-948B-1728B52AA6E4}">
+                  <adec:decorative xmlns:adec="http://schemas.microsoft.com/office/drawing/2017/decorative" val="1"/>
+                </a:ext>
+              </a:extLst>
+            </p:cNvPr>
+            <p:cNvSpPr/>
+            <p:nvPr>
+              <p:extLst>
+                <p:ext uri="{386F3935-93C4-4BCD-93E2-E3B085C9AB24}">
+                  <p16:designElem xmlns:p16="http://schemas.microsoft.com/office/powerpoint/2015/main" val="1"/>
+                </p:ext>
+              </p:extLst>
+            </p:nvPr>
+          </p:nvSpPr>
+          <p:spPr>
+            <a:xfrm rot="2700000">
+              <a:off x="304800" y="965970"/>
+              <a:ext cx="1066799" cy="1066799"/>
+            </a:xfrm>
+            <a:custGeom>
+              <a:avLst/>
+              <a:gdLst>
+                <a:gd name="connsiteX0" fmla="*/ 4053340 w 6859500"/>
+                <a:gd name="connsiteY0" fmla="*/ 6235893 h 6859500"/>
+                <a:gd name="connsiteX1" fmla="*/ 4053340 w 6859500"/>
+                <a:gd name="connsiteY1" fmla="*/ 4053340 h 6859500"/>
+                <a:gd name="connsiteX2" fmla="*/ 6235893 w 6859500"/>
+                <a:gd name="connsiteY2" fmla="*/ 4053340 h 6859500"/>
+                <a:gd name="connsiteX3" fmla="*/ 6859501 w 6859500"/>
+                <a:gd name="connsiteY3" fmla="*/ 3429731 h 6859500"/>
+                <a:gd name="connsiteX4" fmla="*/ 6235893 w 6859500"/>
+                <a:gd name="connsiteY4" fmla="*/ 2806123 h 6859500"/>
+                <a:gd name="connsiteX5" fmla="*/ 4053340 w 6859500"/>
+                <a:gd name="connsiteY5" fmla="*/ 2806123 h 6859500"/>
+                <a:gd name="connsiteX6" fmla="*/ 4053340 w 6859500"/>
+                <a:gd name="connsiteY6" fmla="*/ 623608 h 6859500"/>
+                <a:gd name="connsiteX7" fmla="*/ 3429731 w 6859500"/>
+                <a:gd name="connsiteY7" fmla="*/ 0 h 6859500"/>
+                <a:gd name="connsiteX8" fmla="*/ 2806123 w 6859500"/>
+                <a:gd name="connsiteY8" fmla="*/ 623608 h 6859500"/>
+                <a:gd name="connsiteX9" fmla="*/ 2806123 w 6859500"/>
+                <a:gd name="connsiteY9" fmla="*/ 2806161 h 6859500"/>
+                <a:gd name="connsiteX10" fmla="*/ 623608 w 6859500"/>
+                <a:gd name="connsiteY10" fmla="*/ 2806161 h 6859500"/>
+                <a:gd name="connsiteX11" fmla="*/ 0 w 6859500"/>
+                <a:gd name="connsiteY11" fmla="*/ 3429731 h 6859500"/>
+                <a:gd name="connsiteX12" fmla="*/ 623608 w 6859500"/>
+                <a:gd name="connsiteY12" fmla="*/ 4053340 h 6859500"/>
+                <a:gd name="connsiteX13" fmla="*/ 2806161 w 6859500"/>
+                <a:gd name="connsiteY13" fmla="*/ 4053340 h 6859500"/>
+                <a:gd name="connsiteX14" fmla="*/ 2806161 w 6859500"/>
+                <a:gd name="connsiteY14" fmla="*/ 6235893 h 6859500"/>
+                <a:gd name="connsiteX15" fmla="*/ 3429770 w 6859500"/>
+                <a:gd name="connsiteY15" fmla="*/ 6859501 h 6859500"/>
+                <a:gd name="connsiteX16" fmla="*/ 4053340 w 6859500"/>
+                <a:gd name="connsiteY16" fmla="*/ 6235893 h 6859500"/>
+              </a:gdLst>
+              <a:ahLst/>
+              <a:cxnLst>
+                <a:cxn ang="0">
+                  <a:pos x="connsiteX0" y="connsiteY0"/>
+                </a:cxn>
+                <a:cxn ang="0">
+                  <a:pos x="connsiteX1" y="connsiteY1"/>
+                </a:cxn>
+                <a:cxn ang="0">
+                  <a:pos x="connsiteX2" y="connsiteY2"/>
+                </a:cxn>
+                <a:cxn ang="0">
+                  <a:pos x="connsiteX3" y="connsiteY3"/>
+                </a:cxn>
+                <a:cxn ang="0">
+                  <a:pos x="connsiteX4" y="connsiteY4"/>
+                </a:cxn>
+                <a:cxn ang="0">
+                  <a:pos x="connsiteX5" y="connsiteY5"/>
+                </a:cxn>
+                <a:cxn ang="0">
+                  <a:pos x="connsiteX6" y="connsiteY6"/>
+                </a:cxn>
+                <a:cxn ang="0">
+                  <a:pos x="connsiteX7" y="connsiteY7"/>
+                </a:cxn>
+                <a:cxn ang="0">
+                  <a:pos x="connsiteX8" y="connsiteY8"/>
+                </a:cxn>
+                <a:cxn ang="0">
+                  <a:pos x="connsiteX9" y="connsiteY9"/>
+                </a:cxn>
+                <a:cxn ang="0">
+                  <a:pos x="connsiteX10" y="connsiteY10"/>
+                </a:cxn>
+                <a:cxn ang="0">
+                  <a:pos x="connsiteX11" y="connsiteY11"/>
+                </a:cxn>
+                <a:cxn ang="0">
+                  <a:pos x="connsiteX12" y="connsiteY12"/>
+                </a:cxn>
+                <a:cxn ang="0">
+                  <a:pos x="connsiteX13" y="connsiteY13"/>
+                </a:cxn>
+                <a:cxn ang="0">
+                  <a:pos x="connsiteX14" y="connsiteY14"/>
+                </a:cxn>
+                <a:cxn ang="0">
+                  <a:pos x="connsiteX15" y="connsiteY15"/>
+                </a:cxn>
+                <a:cxn ang="0">
+                  <a:pos x="connsiteX16" y="connsiteY16"/>
+                </a:cxn>
+              </a:cxnLst>
+              <a:rect l="l" t="t" r="r" b="b"/>
+              <a:pathLst>
+                <a:path w="6859500" h="6859500">
+                  <a:moveTo>
+                    <a:pt x="4053340" y="6235893"/>
+                  </a:moveTo>
+                  <a:lnTo>
+                    <a:pt x="4053340" y="4053340"/>
+                  </a:lnTo>
+                  <a:lnTo>
+                    <a:pt x="6235893" y="4053340"/>
+                  </a:lnTo>
+                  <a:cubicBezTo>
+                    <a:pt x="6580293" y="4053340"/>
+                    <a:pt x="6859501" y="3774132"/>
+                    <a:pt x="6859501" y="3429731"/>
+                  </a:cubicBezTo>
+                  <a:cubicBezTo>
+                    <a:pt x="6859501" y="3085330"/>
+                    <a:pt x="6580332" y="2806123"/>
+                    <a:pt x="6235893" y="2806123"/>
+                  </a:cubicBezTo>
+                  <a:lnTo>
+                    <a:pt x="4053340" y="2806123"/>
+                  </a:lnTo>
+                  <a:lnTo>
+                    <a:pt x="4053340" y="623608"/>
+                  </a:lnTo>
+                  <a:cubicBezTo>
+                    <a:pt x="4053340" y="279208"/>
+                    <a:pt x="3774171" y="0"/>
+                    <a:pt x="3429731" y="0"/>
+                  </a:cubicBezTo>
+                  <a:cubicBezTo>
+                    <a:pt x="3085330" y="0"/>
+                    <a:pt x="2806123" y="279208"/>
+                    <a:pt x="2806123" y="623608"/>
+                  </a:cubicBezTo>
+                  <a:lnTo>
+                    <a:pt x="2806123" y="2806161"/>
+                  </a:lnTo>
+                  <a:lnTo>
+                    <a:pt x="623608" y="2806161"/>
+                  </a:lnTo>
+                  <a:cubicBezTo>
+                    <a:pt x="279208" y="2806161"/>
+                    <a:pt x="0" y="3085369"/>
+                    <a:pt x="0" y="3429731"/>
+                  </a:cubicBezTo>
+                  <a:cubicBezTo>
+                    <a:pt x="0" y="3774132"/>
+                    <a:pt x="279208" y="4053340"/>
+                    <a:pt x="623608" y="4053340"/>
+                  </a:cubicBezTo>
+                  <a:lnTo>
+                    <a:pt x="2806161" y="4053340"/>
+                  </a:lnTo>
+                  <a:lnTo>
+                    <a:pt x="2806161" y="6235893"/>
+                  </a:lnTo>
+                  <a:cubicBezTo>
+                    <a:pt x="2806161" y="6580293"/>
+                    <a:pt x="3085369" y="6859501"/>
+                    <a:pt x="3429770" y="6859501"/>
+                  </a:cubicBezTo>
+                  <a:cubicBezTo>
+                    <a:pt x="3774171" y="6859501"/>
+                    <a:pt x="4053340" y="6580293"/>
+                    <a:pt x="4053340" y="6235893"/>
+                  </a:cubicBezTo>
+                  <a:close/>
+                </a:path>
+              </a:pathLst>
+            </a:custGeom>
+            <a:ln w="3848" cap="flat">
+              <a:noFill/>
+              <a:prstDash val="solid"/>
+              <a:miter/>
+            </a:ln>
+            <a:effectLst>
+              <a:glow rad="152400">
+                <a:srgbClr val="000000">
+                  <a:alpha val="4000"/>
+                </a:srgbClr>
+              </a:glow>
+              <a:outerShdw blurRad="101600" dist="38100" dir="16200000" rotWithShape="0">
+                <a:srgbClr val="000000">
+                  <a:alpha val="5000"/>
+                </a:srgbClr>
+              </a:outerShdw>
+            </a:effectLst>
+          </p:spPr>
+          <p:txBody>
+            <a:bodyPr rtlCol="0" anchor="ctr"/>
+            <a:lstStyle/>
+            <a:p>
+              <a:endParaRPr lang="en-US" dirty="0"/>
+            </a:p>
+          </p:txBody>
+        </p:sp>
+        <p:sp useBgFill="1">
+          <p:nvSpPr>
+            <p:cNvPr id="66" name="Oval 65">
+              <a:extLst>
+                <a:ext uri="{FF2B5EF4-FFF2-40B4-BE49-F238E27FC236}">
+                  <a16:creationId xmlns:a16="http://schemas.microsoft.com/office/drawing/2014/main" id="{23CA1A51-8DB4-445D-8FE3-498DB75CA588}"/>
+                </a:ext>
+                <a:ext uri="{C183D7F6-B498-43B3-948B-1728B52AA6E4}">
+                  <adec:decorative xmlns:adec="http://schemas.microsoft.com/office/drawing/2017/decorative" val="1"/>
+                </a:ext>
+              </a:extLst>
+            </p:cNvPr>
+            <p:cNvSpPr/>
+            <p:nvPr>
+              <p:extLst>
+                <p:ext uri="{386F3935-93C4-4BCD-93E2-E3B085C9AB24}">
+                  <p16:designElem xmlns:p16="http://schemas.microsoft.com/office/powerpoint/2015/main" val="1"/>
+                </p:ext>
+              </p:extLst>
+            </p:nvPr>
+          </p:nvSpPr>
+          <p:spPr>
+            <a:xfrm rot="10800000">
+              <a:off x="1815651" y="1342540"/>
+              <a:ext cx="215724" cy="215724"/>
+            </a:xfrm>
+            <a:prstGeom prst="ellipse">
+              <a:avLst/>
+            </a:prstGeom>
+            <a:ln w="3848" cap="flat">
+              <a:noFill/>
+              <a:prstDash val="solid"/>
+              <a:miter/>
+            </a:ln>
+            <a:effectLst>
+              <a:glow rad="152400">
+                <a:srgbClr val="000000">
+                  <a:alpha val="4000"/>
+                </a:srgbClr>
+              </a:glow>
+              <a:outerShdw blurRad="101600" dist="38100" dir="16200000" rotWithShape="0">
+                <a:srgbClr val="000000">
+                  <a:alpha val="5000"/>
+                </a:srgbClr>
+              </a:outerShdw>
+            </a:effectLst>
+          </p:spPr>
+          <p:txBody>
+            <a:bodyPr rtlCol="0" anchor="ctr"/>
+            <a:lstStyle/>
+            <a:p>
+              <a:endParaRPr lang="en-US" dirty="0"/>
+            </a:p>
+          </p:txBody>
+        </p:sp>
+        <p:sp useBgFill="1">
+          <p:nvSpPr>
+            <p:cNvPr id="67" name="Oval 66">
+              <a:extLst>
+                <a:ext uri="{FF2B5EF4-FFF2-40B4-BE49-F238E27FC236}">
+                  <a16:creationId xmlns:a16="http://schemas.microsoft.com/office/drawing/2014/main" id="{75DDD5AB-14AC-434C-95CC-18B81FAD36B9}"/>
+                </a:ext>
+                <a:ext uri="{C183D7F6-B498-43B3-948B-1728B52AA6E4}">
+                  <adec:decorative xmlns:adec="http://schemas.microsoft.com/office/drawing/2017/decorative" val="1"/>
+                </a:ext>
+              </a:extLst>
+            </p:cNvPr>
+            <p:cNvSpPr/>
+            <p:nvPr>
+              <p:extLst>
+                <p:ext uri="{386F3935-93C4-4BCD-93E2-E3B085C9AB24}">
+                  <p16:designElem xmlns:p16="http://schemas.microsoft.com/office/powerpoint/2015/main" val="1"/>
+                </p:ext>
+              </p:extLst>
+            </p:nvPr>
+          </p:nvSpPr>
+          <p:spPr>
+            <a:xfrm rot="10800000">
+              <a:off x="183404" y="225822"/>
+              <a:ext cx="474023" cy="474023"/>
+            </a:xfrm>
+            <a:prstGeom prst="ellipse">
+              <a:avLst/>
+            </a:prstGeom>
+            <a:ln w="3848" cap="flat">
+              <a:noFill/>
+              <a:prstDash val="solid"/>
+              <a:miter/>
+            </a:ln>
+            <a:effectLst>
+              <a:glow rad="152400">
+                <a:srgbClr val="000000">
+                  <a:alpha val="4000"/>
+                </a:srgbClr>
+              </a:glow>
+              <a:outerShdw blurRad="101600" dist="38100" dir="16200000" rotWithShape="0">
+                <a:srgbClr val="000000">
+                  <a:alpha val="5000"/>
+                </a:srgbClr>
+              </a:outerShdw>
+            </a:effectLst>
+          </p:spPr>
+          <p:txBody>
+            <a:bodyPr rtlCol="0" anchor="ctr"/>
+            <a:lstStyle/>
+            <a:p>
+              <a:endParaRPr lang="en-US"/>
+            </a:p>
+          </p:txBody>
+        </p:sp>
+        <p:sp useBgFill="1">
+          <p:nvSpPr>
+            <p:cNvPr id="68" name="Oval 67">
+              <a:extLst>
+                <a:ext uri="{FF2B5EF4-FFF2-40B4-BE49-F238E27FC236}">
+                  <a16:creationId xmlns:a16="http://schemas.microsoft.com/office/drawing/2014/main" id="{673FC915-211E-480B-8EC6-9659D9FCA15F}"/>
+                </a:ext>
+                <a:ext uri="{C183D7F6-B498-43B3-948B-1728B52AA6E4}">
+                  <adec:decorative xmlns:adec="http://schemas.microsoft.com/office/drawing/2017/decorative" val="1"/>
+                </a:ext>
+              </a:extLst>
+            </p:cNvPr>
+            <p:cNvSpPr/>
+            <p:nvPr>
+              <p:extLst>
+                <p:ext uri="{386F3935-93C4-4BCD-93E2-E3B085C9AB24}">
+                  <p16:designElem xmlns:p16="http://schemas.microsoft.com/office/powerpoint/2015/main" val="1"/>
+                </p:ext>
+              </p:extLst>
+            </p:nvPr>
+          </p:nvSpPr>
+          <p:spPr>
+            <a:xfrm rot="10800000">
+              <a:off x="583574" y="2333139"/>
+              <a:ext cx="330825" cy="330825"/>
+            </a:xfrm>
+            <a:prstGeom prst="ellipse">
+              <a:avLst/>
+            </a:prstGeom>
+            <a:ln w="3848" cap="flat">
+              <a:noFill/>
+              <a:prstDash val="solid"/>
+              <a:miter/>
+            </a:ln>
+            <a:effectLst>
+              <a:glow rad="152400">
+                <a:srgbClr val="000000">
+                  <a:alpha val="4000"/>
+                </a:srgbClr>
+              </a:glow>
+              <a:outerShdw blurRad="101600" dist="38100" dir="16200000" rotWithShape="0">
+                <a:srgbClr val="000000">
+                  <a:alpha val="5000"/>
+                </a:srgbClr>
+              </a:outerShdw>
+            </a:effectLst>
+          </p:spPr>
+          <p:txBody>
+            <a:bodyPr rtlCol="0" anchor="ctr"/>
+            <a:lstStyle/>
+            <a:p>
+              <a:endParaRPr lang="en-US" dirty="0"/>
+            </a:p>
+          </p:txBody>
+        </p:sp>
+      </p:grpSp>
+      <p:sp>
+        <p:nvSpPr>
+          <p:cNvPr id="70" name="Rectangle 69">
+            <a:extLst>
+              <a:ext uri="{FF2B5EF4-FFF2-40B4-BE49-F238E27FC236}">
+                <a16:creationId xmlns:a16="http://schemas.microsoft.com/office/drawing/2014/main" id="{EA80DA9C-57E0-4991-B11A-51E132563976}"/>
+              </a:ext>
+              <a:ext uri="{C183D7F6-B498-43B3-948B-1728B52AA6E4}">
+                <adec:decorative xmlns:adec="http://schemas.microsoft.com/office/drawing/2017/decorative" val="1"/>
+              </a:ext>
+            </a:extLst>
+          </p:cNvPr>
+          <p:cNvSpPr>
+            <a:spLocks noGrp="1" noRot="1" noChangeAspect="1" noMove="1" noResize="1" noEditPoints="1" noAdjustHandles="1" noChangeArrowheads="1" noChangeShapeType="1" noTextEdit="1"/>
+          </p:cNvSpPr>
+          <p:nvPr>
+            <p:extLst>
+              <p:ext uri="{386F3935-93C4-4BCD-93E2-E3B085C9AB24}">
+                <p16:designElem xmlns:p16="http://schemas.microsoft.com/office/powerpoint/2015/main" val="1"/>
+              </p:ext>
+            </p:extLst>
+          </p:nvPr>
+        </p:nvSpPr>
+        <p:spPr>
+          <a:xfrm>
+            <a:off x="0" y="0"/>
+            <a:ext cx="12192000" cy="6858000"/>
+          </a:xfrm>
+          <a:prstGeom prst="rect">
+            <a:avLst/>
+          </a:prstGeom>
+          <a:solidFill>
+            <a:schemeClr val="accent2">
+              <a:alpha val="40000"/>
+            </a:schemeClr>
+          </a:solidFill>
+          <a:ln w="3848" cap="flat">
+            <a:noFill/>
+            <a:prstDash val="solid"/>
+            <a:miter/>
+          </a:ln>
+          <a:effectLst/>
+        </p:spPr>
+        <p:txBody>
+          <a:bodyPr rtlCol="0" anchor="ctr"/>
+          <a:lstStyle/>
+          <a:p>
+            <a:endParaRPr lang="en-US" dirty="0">
+              <a:solidFill>
+                <a:schemeClr val="tx1"/>
+              </a:solidFill>
+            </a:endParaRPr>
+          </a:p>
+        </p:txBody>
+      </p:sp>
+      <p:sp>
+        <p:nvSpPr>
+          <p:cNvPr id="2" name="Titel 1">
+            <a:extLst>
+              <a:ext uri="{FF2B5EF4-FFF2-40B4-BE49-F238E27FC236}">
+                <a16:creationId xmlns:a16="http://schemas.microsoft.com/office/drawing/2014/main" id="{166D44C1-0399-BE77-62C3-E0FEB30405B3}"/>
+              </a:ext>
+            </a:extLst>
+          </p:cNvPr>
+          <p:cNvSpPr>
+            <a:spLocks noGrp="1"/>
+          </p:cNvSpPr>
+          <p:nvPr>
+            <p:ph type="title"/>
+          </p:nvPr>
+        </p:nvSpPr>
+        <p:spPr>
+          <a:xfrm>
+            <a:off x="822352" y="566126"/>
+            <a:ext cx="10531448" cy="2210521"/>
+          </a:xfrm>
+        </p:spPr>
+        <p:txBody>
+          <a:bodyPr anchor="b">
+            <a:normAutofit/>
+          </a:bodyPr>
+          <a:lstStyle/>
+          <a:p>
+            <a:pPr algn="ctr"/>
+            <a:r>
+              <a:rPr lang="de-DE" dirty="0">
+                <a:solidFill>
+                  <a:srgbClr val="FFFFFF"/>
+                </a:solidFill>
+              </a:rPr>
+              <a:t>Er-Diagramm</a:t>
+            </a:r>
+          </a:p>
+        </p:txBody>
+      </p:sp>
+      <p:sp>
+        <p:nvSpPr>
+          <p:cNvPr id="22" name="Inhaltsplatzhalter 21">
+            <a:extLst>
+              <a:ext uri="{FF2B5EF4-FFF2-40B4-BE49-F238E27FC236}">
+                <a16:creationId xmlns:a16="http://schemas.microsoft.com/office/drawing/2014/main" id="{6DCB555E-AFA6-20DE-1D69-797B56267E42}"/>
+              </a:ext>
+            </a:extLst>
+          </p:cNvPr>
+          <p:cNvSpPr>
+            <a:spLocks noGrp="1"/>
+          </p:cNvSpPr>
+          <p:nvPr>
+            <p:ph idx="1"/>
+          </p:nvPr>
+        </p:nvSpPr>
+        <p:spPr>
+          <a:xfrm>
+            <a:off x="1992663" y="2948363"/>
+            <a:ext cx="8188032" cy="3176250"/>
+          </a:xfrm>
+        </p:spPr>
+        <p:txBody>
+          <a:bodyPr anchor="t">
+            <a:normAutofit/>
+          </a:bodyPr>
+          <a:lstStyle/>
+          <a:p>
+            <a:pPr algn="ctr"/>
+            <a:r>
+              <a:rPr lang="de-DE" sz="1800">
+                <a:solidFill>
+                  <a:srgbClr val="FFFFFF"/>
+                </a:solidFill>
+              </a:rPr>
+              <a:t>Ddg</a:t>
+            </a:r>
+            <a:endParaRPr lang="de-DE" sz="1800" dirty="0">
+              <a:solidFill>
+                <a:srgbClr val="FFFFFF"/>
+              </a:solidFill>
+            </a:endParaRPr>
+          </a:p>
+          <a:p>
+            <a:pPr algn="ctr"/>
+            <a:r>
+              <a:rPr lang="de-DE" sz="1800" dirty="0">
+                <a:solidFill>
+                  <a:srgbClr val="FFFFFF"/>
+                </a:solidFill>
+              </a:rPr>
+              <a:t>Dfg</a:t>
+            </a:r>
+          </a:p>
+          <a:p>
+            <a:pPr algn="ctr"/>
+            <a:endParaRPr lang="de-DE" sz="1800" dirty="0">
+              <a:solidFill>
+                <a:srgbClr val="FFFFFF"/>
+              </a:solidFill>
+            </a:endParaRPr>
+          </a:p>
+          <a:p>
+            <a:pPr algn="ctr"/>
+            <a:r>
+              <a:rPr lang="de-DE" sz="1800">
+                <a:solidFill>
+                  <a:srgbClr val="FFFFFF"/>
+                </a:solidFill>
+              </a:rPr>
+              <a:t>Dfgdf</a:t>
+            </a:r>
+            <a:endParaRPr lang="de-DE" sz="1800" dirty="0">
+              <a:solidFill>
+                <a:srgbClr val="FFFFFF"/>
+              </a:solidFill>
+            </a:endParaRPr>
+          </a:p>
+          <a:p>
+            <a:pPr algn="ctr"/>
+            <a:r>
+              <a:rPr lang="de-DE" sz="1800" dirty="0">
+                <a:solidFill>
+                  <a:srgbClr val="FFFFFF"/>
+                </a:solidFill>
+              </a:rPr>
+              <a:t>G</a:t>
+            </a:r>
+          </a:p>
+          <a:p>
+            <a:pPr algn="ctr"/>
+            <a:r>
+              <a:rPr lang="de-DE" sz="1800">
+                <a:solidFill>
+                  <a:srgbClr val="FFFFFF"/>
+                </a:solidFill>
+              </a:rPr>
+              <a:t>df</a:t>
+            </a:r>
+            <a:endParaRPr lang="de-DE" sz="1800" dirty="0">
+              <a:solidFill>
+                <a:srgbClr val="FFFFFF"/>
+              </a:solidFill>
+            </a:endParaRPr>
+          </a:p>
+        </p:txBody>
+      </p:sp>
+      <p:pic>
+        <p:nvPicPr>
+          <p:cNvPr id="29" name="Grafik 28" descr="Ein Bild, das Diagramm, Kreis, Reihe enthält.&#10;&#10;Automatisch generierte Beschreibung">
+            <a:extLst>
+              <a:ext uri="{FF2B5EF4-FFF2-40B4-BE49-F238E27FC236}">
+                <a16:creationId xmlns:a16="http://schemas.microsoft.com/office/drawing/2014/main" id="{E5A8110E-8932-48FE-72E5-A5D03E2BCA68}"/>
+              </a:ext>
+            </a:extLst>
+          </p:cNvPr>
+          <p:cNvPicPr>
+            <a:picLocks noChangeAspect="1"/>
+          </p:cNvPicPr>
+          <p:nvPr/>
+        </p:nvPicPr>
+        <p:blipFill>
+          <a:blip r:embed="rId3">
+            <a:extLst>
+              <a:ext uri="{28A0092B-C50C-407E-A947-70E740481C1C}">
+                <a14:useLocalDpi xmlns:a14="http://schemas.microsoft.com/office/drawing/2010/main" val="0"/>
+              </a:ext>
+            </a:extLst>
+          </a:blip>
+          <a:stretch>
+            <a:fillRect/>
+          </a:stretch>
+        </p:blipFill>
+        <p:spPr>
+          <a:xfrm>
+            <a:off x="2646928" y="2948363"/>
+            <a:ext cx="6879502" cy="3176250"/>
+          </a:xfrm>
+          <a:prstGeom prst="rect">
+            <a:avLst/>
+          </a:prstGeom>
+        </p:spPr>
+      </p:pic>
+    </p:spTree>
+    <p:extLst>
+      <p:ext uri="{BB962C8B-B14F-4D97-AF65-F5344CB8AC3E}">
+        <p14:creationId xmlns:p14="http://schemas.microsoft.com/office/powerpoint/2010/main" val="1464754026"/>
+      </p:ext>
+    </p:extLst>
+  </p:cSld>
+  <p:clrMapOvr>
+    <a:masterClrMapping/>
+  </p:clrMapOvr>
+</p:sld>
+</file>
+
+<file path=ppt/slides/slide5.xml><?xml version="1.0" encoding="utf-8"?>
+<p:sld xmlns:a="http://schemas.openxmlformats.org/drawingml/2006/main" xmlns:r="http://schemas.openxmlformats.org/officeDocument/2006/relationships" xmlns:p="http://schemas.openxmlformats.org/presentationml/2006/main">
+  <p:cSld>
+    <p:bg>
+      <p:bgPr>
+        <a:solidFill>
+          <a:schemeClr val="bg1"/>
+        </a:solidFill>
+        <a:effectLst/>
+      </p:bgPr>
+    </p:bg>
+    <p:spTree>
+      <p:nvGrpSpPr>
+        <p:cNvPr id="1" name=""/>
+        <p:cNvGrpSpPr/>
+        <p:nvPr/>
+      </p:nvGrpSpPr>
+      <p:grpSpPr>
+        <a:xfrm>
+          <a:off x="0" y="0"/>
+          <a:ext cx="0" cy="0"/>
+          <a:chOff x="0" y="0"/>
+          <a:chExt cx="0" cy="0"/>
+        </a:xfrm>
+      </p:grpSpPr>
+      <p:sp useBgFill="1">
+        <p:nvSpPr>
+          <p:cNvPr id="12" name="Rectangle 11">
+            <a:extLst>
+              <a:ext uri="{FF2B5EF4-FFF2-40B4-BE49-F238E27FC236}">
+                <a16:creationId xmlns:a16="http://schemas.microsoft.com/office/drawing/2014/main" id="{25AD4A59-91FA-4E30-8F32-A8AB51F768C6}"/>
+              </a:ext>
+              <a:ext uri="{C183D7F6-B498-43B3-948B-1728B52AA6E4}">
+                <adec:decorative xmlns:adec="http://schemas.microsoft.com/office/drawing/2017/decorative" val="1"/>
+              </a:ext>
+            </a:extLst>
+          </p:cNvPr>
+          <p:cNvSpPr>
+            <a:spLocks noGrp="1" noRot="1" noChangeAspect="1" noMove="1" noResize="1" noEditPoints="1" noAdjustHandles="1" noChangeArrowheads="1" noChangeShapeType="1" noTextEdit="1"/>
+          </p:cNvSpPr>
+          <p:nvPr>
+            <p:extLst>
+              <p:ext uri="{386F3935-93C4-4BCD-93E2-E3B085C9AB24}">
+                <p16:designElem xmlns:p16="http://schemas.microsoft.com/office/powerpoint/2015/main" val="1"/>
+              </p:ext>
+            </p:extLst>
+          </p:nvPr>
+        </p:nvSpPr>
+        <p:spPr>
+          <a:xfrm>
+            <a:off x="0" y="0"/>
+            <a:ext cx="12192000" cy="6858000"/>
+          </a:xfrm>
+          <a:prstGeom prst="rect">
+            <a:avLst/>
+          </a:prstGeom>
+          <a:ln w="3848" cap="flat">
+            <a:noFill/>
+            <a:prstDash val="solid"/>
+            <a:miter/>
+          </a:ln>
+          <a:effectLst/>
+        </p:spPr>
+        <p:txBody>
+          <a:bodyPr rtlCol="0" anchor="ctr"/>
+          <a:lstStyle/>
+          <a:p>
+            <a:endParaRPr lang="en-US" dirty="0">
+              <a:solidFill>
+                <a:schemeClr val="tx1"/>
+              </a:solidFill>
+            </a:endParaRPr>
+          </a:p>
+        </p:txBody>
+      </p:sp>
+      <p:sp>
+        <p:nvSpPr>
+          <p:cNvPr id="14" name="Rectangle 13">
+            <a:extLst>
+              <a:ext uri="{FF2B5EF4-FFF2-40B4-BE49-F238E27FC236}">
+                <a16:creationId xmlns:a16="http://schemas.microsoft.com/office/drawing/2014/main" id="{01AF26B4-1569-483F-8223-4C515A87A527}"/>
+              </a:ext>
+              <a:ext uri="{C183D7F6-B498-43B3-948B-1728B52AA6E4}">
+                <adec:decorative xmlns:adec="http://schemas.microsoft.com/office/drawing/2017/decorative" val="1"/>
+              </a:ext>
+            </a:extLst>
+          </p:cNvPr>
+          <p:cNvSpPr>
+            <a:spLocks noGrp="1" noRot="1" noChangeAspect="1" noMove="1" noResize="1" noEditPoints="1" noAdjustHandles="1" noChangeArrowheads="1" noChangeShapeType="1" noTextEdit="1"/>
+          </p:cNvSpPr>
+          <p:nvPr>
+            <p:extLst>
+              <p:ext uri="{386F3935-93C4-4BCD-93E2-E3B085C9AB24}">
+                <p16:designElem xmlns:p16="http://schemas.microsoft.com/office/powerpoint/2015/main" val="1"/>
+              </p:ext>
+            </p:extLst>
+          </p:nvPr>
+        </p:nvSpPr>
+        <p:spPr>
+          <a:xfrm>
+            <a:off x="0" y="0"/>
+            <a:ext cx="12192000" cy="6858000"/>
+          </a:xfrm>
+          <a:prstGeom prst="rect">
+            <a:avLst/>
+          </a:prstGeom>
+          <a:solidFill>
+            <a:srgbClr val="FFFFFF">
+              <a:alpha val="10000"/>
+            </a:srgbClr>
+          </a:solidFill>
+          <a:ln w="3848" cap="flat">
+            <a:noFill/>
+            <a:prstDash val="solid"/>
+            <a:miter/>
+          </a:ln>
+          <a:effectLst/>
+        </p:spPr>
+        <p:txBody>
+          <a:bodyPr rtlCol="0" anchor="ctr"/>
+          <a:lstStyle/>
+          <a:p>
+            <a:endParaRPr lang="en-US" dirty="0">
+              <a:solidFill>
+                <a:schemeClr val="tx1"/>
+              </a:solidFill>
+            </a:endParaRPr>
+          </a:p>
+        </p:txBody>
+      </p:sp>
+      <p:pic>
+        <p:nvPicPr>
+          <p:cNvPr id="5" name="Inhaltsplatzhalter 4">
+            <a:extLst>
+              <a:ext uri="{FF2B5EF4-FFF2-40B4-BE49-F238E27FC236}">
+                <a16:creationId xmlns:a16="http://schemas.microsoft.com/office/drawing/2014/main" id="{22D6AE77-1039-4B4B-F33C-E274FAEA8001}"/>
+              </a:ext>
+              <a:ext uri="{C183D7F6-B498-43B3-948B-1728B52AA6E4}">
+                <adec:decorative xmlns:adec="http://schemas.microsoft.com/office/drawing/2017/decorative" val="1"/>
+              </a:ext>
+            </a:extLst>
+          </p:cNvPr>
+          <p:cNvPicPr>
+            <a:picLocks noChangeAspect="1"/>
+          </p:cNvPicPr>
+          <p:nvPr/>
+        </p:nvPicPr>
+        <p:blipFill rotWithShape="1">
+          <a:blip r:embed="rId2">
+            <a:extLst>
+              <a:ext uri="{28A0092B-C50C-407E-A947-70E740481C1C}">
+                <a14:useLocalDpi xmlns:a14="http://schemas.microsoft.com/office/drawing/2010/main" val="0"/>
+              </a:ext>
+            </a:extLst>
+          </a:blip>
+          <a:srcRect r="25"/>
+          <a:stretch/>
+        </p:blipFill>
+        <p:spPr>
+          <a:xfrm>
+            <a:off x="-7798" y="-100584"/>
+            <a:ext cx="12269902" cy="7040880"/>
+          </a:xfrm>
+          <a:prstGeom prst="rect">
+            <a:avLst/>
+          </a:prstGeom>
+        </p:spPr>
+      </p:pic>
+      <p:grpSp>
+        <p:nvGrpSpPr>
+          <p:cNvPr id="16" name="Group 15">
+            <a:extLst>
+              <a:ext uri="{FF2B5EF4-FFF2-40B4-BE49-F238E27FC236}">
+                <a16:creationId xmlns:a16="http://schemas.microsoft.com/office/drawing/2014/main" id="{1AC8529D-DF13-4349-856C-DA81451848A7}"/>
+              </a:ext>
+              <a:ext uri="{C183D7F6-B498-43B3-948B-1728B52AA6E4}">
+                <adec:decorative xmlns:adec="http://schemas.microsoft.com/office/drawing/2017/decorative" val="1"/>
+              </a:ext>
+            </a:extLst>
+          </p:cNvPr>
+          <p:cNvGrpSpPr>
+            <a:grpSpLocks noGrp="1" noUngrp="1" noRot="1" noChangeAspect="1" noMove="1" noResize="1"/>
+          </p:cNvGrpSpPr>
+          <p:nvPr>
+            <p:extLst>
+              <p:ext uri="{386F3935-93C4-4BCD-93E2-E3B085C9AB24}">
+                <p16:designElem xmlns:p16="http://schemas.microsoft.com/office/powerpoint/2015/main" val="1"/>
+              </p:ext>
+            </p:extLst>
+          </p:nvPr>
+        </p:nvGrpSpPr>
+        <p:grpSpPr>
+          <a:xfrm>
+            <a:off x="183404" y="225822"/>
+            <a:ext cx="1847971" cy="2438142"/>
+            <a:chOff x="183404" y="225822"/>
+            <a:chExt cx="1847971" cy="2438142"/>
+          </a:xfrm>
+        </p:grpSpPr>
+        <p:sp useBgFill="1">
+          <p:nvSpPr>
+            <p:cNvPr id="17" name="Graphic 10">
+              <a:extLst>
+                <a:ext uri="{FF2B5EF4-FFF2-40B4-BE49-F238E27FC236}">
+                  <a16:creationId xmlns:a16="http://schemas.microsoft.com/office/drawing/2014/main" id="{23EB0175-B014-4375-9C83-BA3BC7588FC4}"/>
+                </a:ext>
+                <a:ext uri="{C183D7F6-B498-43B3-948B-1728B52AA6E4}">
+                  <adec:decorative xmlns:adec="http://schemas.microsoft.com/office/drawing/2017/decorative" val="1"/>
+                </a:ext>
+              </a:extLst>
+            </p:cNvPr>
+            <p:cNvSpPr/>
+            <p:nvPr>
+              <p:extLst>
+                <p:ext uri="{386F3935-93C4-4BCD-93E2-E3B085C9AB24}">
+                  <p16:designElem xmlns:p16="http://schemas.microsoft.com/office/powerpoint/2015/main" val="1"/>
+                </p:ext>
+              </p:extLst>
+            </p:nvPr>
+          </p:nvSpPr>
+          <p:spPr>
+            <a:xfrm rot="2700000">
+              <a:off x="304800" y="965970"/>
+              <a:ext cx="1066799" cy="1066799"/>
+            </a:xfrm>
+            <a:custGeom>
+              <a:avLst/>
+              <a:gdLst>
+                <a:gd name="connsiteX0" fmla="*/ 4053340 w 6859500"/>
+                <a:gd name="connsiteY0" fmla="*/ 6235893 h 6859500"/>
+                <a:gd name="connsiteX1" fmla="*/ 4053340 w 6859500"/>
+                <a:gd name="connsiteY1" fmla="*/ 4053340 h 6859500"/>
+                <a:gd name="connsiteX2" fmla="*/ 6235893 w 6859500"/>
+                <a:gd name="connsiteY2" fmla="*/ 4053340 h 6859500"/>
+                <a:gd name="connsiteX3" fmla="*/ 6859501 w 6859500"/>
+                <a:gd name="connsiteY3" fmla="*/ 3429731 h 6859500"/>
+                <a:gd name="connsiteX4" fmla="*/ 6235893 w 6859500"/>
+                <a:gd name="connsiteY4" fmla="*/ 2806123 h 6859500"/>
+                <a:gd name="connsiteX5" fmla="*/ 4053340 w 6859500"/>
+                <a:gd name="connsiteY5" fmla="*/ 2806123 h 6859500"/>
+                <a:gd name="connsiteX6" fmla="*/ 4053340 w 6859500"/>
+                <a:gd name="connsiteY6" fmla="*/ 623608 h 6859500"/>
+                <a:gd name="connsiteX7" fmla="*/ 3429731 w 6859500"/>
+                <a:gd name="connsiteY7" fmla="*/ 0 h 6859500"/>
+                <a:gd name="connsiteX8" fmla="*/ 2806123 w 6859500"/>
+                <a:gd name="connsiteY8" fmla="*/ 623608 h 6859500"/>
+                <a:gd name="connsiteX9" fmla="*/ 2806123 w 6859500"/>
+                <a:gd name="connsiteY9" fmla="*/ 2806161 h 6859500"/>
+                <a:gd name="connsiteX10" fmla="*/ 623608 w 6859500"/>
+                <a:gd name="connsiteY10" fmla="*/ 2806161 h 6859500"/>
+                <a:gd name="connsiteX11" fmla="*/ 0 w 6859500"/>
+                <a:gd name="connsiteY11" fmla="*/ 3429731 h 6859500"/>
+                <a:gd name="connsiteX12" fmla="*/ 623608 w 6859500"/>
+                <a:gd name="connsiteY12" fmla="*/ 4053340 h 6859500"/>
+                <a:gd name="connsiteX13" fmla="*/ 2806161 w 6859500"/>
+                <a:gd name="connsiteY13" fmla="*/ 4053340 h 6859500"/>
+                <a:gd name="connsiteX14" fmla="*/ 2806161 w 6859500"/>
+                <a:gd name="connsiteY14" fmla="*/ 6235893 h 6859500"/>
+                <a:gd name="connsiteX15" fmla="*/ 3429770 w 6859500"/>
+                <a:gd name="connsiteY15" fmla="*/ 6859501 h 6859500"/>
+                <a:gd name="connsiteX16" fmla="*/ 4053340 w 6859500"/>
+                <a:gd name="connsiteY16" fmla="*/ 6235893 h 6859500"/>
+              </a:gdLst>
+              <a:ahLst/>
+              <a:cxnLst>
+                <a:cxn ang="0">
+                  <a:pos x="connsiteX0" y="connsiteY0"/>
+                </a:cxn>
+                <a:cxn ang="0">
+                  <a:pos x="connsiteX1" y="connsiteY1"/>
+                </a:cxn>
+                <a:cxn ang="0">
+                  <a:pos x="connsiteX2" y="connsiteY2"/>
+                </a:cxn>
+                <a:cxn ang="0">
+                  <a:pos x="connsiteX3" y="connsiteY3"/>
+                </a:cxn>
+                <a:cxn ang="0">
+                  <a:pos x="connsiteX4" y="connsiteY4"/>
+                </a:cxn>
+                <a:cxn ang="0">
+                  <a:pos x="connsiteX5" y="connsiteY5"/>
+                </a:cxn>
+                <a:cxn ang="0">
+                  <a:pos x="connsiteX6" y="connsiteY6"/>
+                </a:cxn>
+                <a:cxn ang="0">
+                  <a:pos x="connsiteX7" y="connsiteY7"/>
+                </a:cxn>
+                <a:cxn ang="0">
+                  <a:pos x="connsiteX8" y="connsiteY8"/>
+                </a:cxn>
+                <a:cxn ang="0">
+                  <a:pos x="connsiteX9" y="connsiteY9"/>
+                </a:cxn>
+                <a:cxn ang="0">
+                  <a:pos x="connsiteX10" y="connsiteY10"/>
+                </a:cxn>
+                <a:cxn ang="0">
+                  <a:pos x="connsiteX11" y="connsiteY11"/>
+                </a:cxn>
+                <a:cxn ang="0">
+                  <a:pos x="connsiteX12" y="connsiteY12"/>
+                </a:cxn>
+                <a:cxn ang="0">
+                  <a:pos x="connsiteX13" y="connsiteY13"/>
+                </a:cxn>
+                <a:cxn ang="0">
+                  <a:pos x="connsiteX14" y="connsiteY14"/>
+                </a:cxn>
+                <a:cxn ang="0">
+                  <a:pos x="connsiteX15" y="connsiteY15"/>
+                </a:cxn>
+                <a:cxn ang="0">
+                  <a:pos x="connsiteX16" y="connsiteY16"/>
+                </a:cxn>
+              </a:cxnLst>
+              <a:rect l="l" t="t" r="r" b="b"/>
+              <a:pathLst>
+                <a:path w="6859500" h="6859500">
+                  <a:moveTo>
+                    <a:pt x="4053340" y="6235893"/>
+                  </a:moveTo>
+                  <a:lnTo>
+                    <a:pt x="4053340" y="4053340"/>
+                  </a:lnTo>
+                  <a:lnTo>
+                    <a:pt x="6235893" y="4053340"/>
+                  </a:lnTo>
+                  <a:cubicBezTo>
+                    <a:pt x="6580293" y="4053340"/>
+                    <a:pt x="6859501" y="3774132"/>
+                    <a:pt x="6859501" y="3429731"/>
+                  </a:cubicBezTo>
+                  <a:cubicBezTo>
+                    <a:pt x="6859501" y="3085330"/>
+                    <a:pt x="6580332" y="2806123"/>
+                    <a:pt x="6235893" y="2806123"/>
+                  </a:cubicBezTo>
+                  <a:lnTo>
+                    <a:pt x="4053340" y="2806123"/>
+                  </a:lnTo>
+                  <a:lnTo>
+                    <a:pt x="4053340" y="623608"/>
+                  </a:lnTo>
+                  <a:cubicBezTo>
+                    <a:pt x="4053340" y="279208"/>
+                    <a:pt x="3774171" y="0"/>
+                    <a:pt x="3429731" y="0"/>
+                  </a:cubicBezTo>
+                  <a:cubicBezTo>
+                    <a:pt x="3085330" y="0"/>
+                    <a:pt x="2806123" y="279208"/>
+                    <a:pt x="2806123" y="623608"/>
+                  </a:cubicBezTo>
+                  <a:lnTo>
+                    <a:pt x="2806123" y="2806161"/>
+                  </a:lnTo>
+                  <a:lnTo>
+                    <a:pt x="623608" y="2806161"/>
+                  </a:lnTo>
+                  <a:cubicBezTo>
+                    <a:pt x="279208" y="2806161"/>
+                    <a:pt x="0" y="3085369"/>
+                    <a:pt x="0" y="3429731"/>
+                  </a:cubicBezTo>
+                  <a:cubicBezTo>
+                    <a:pt x="0" y="3774132"/>
+                    <a:pt x="279208" y="4053340"/>
+                    <a:pt x="623608" y="4053340"/>
+                  </a:cubicBezTo>
+                  <a:lnTo>
+                    <a:pt x="2806161" y="4053340"/>
+                  </a:lnTo>
+                  <a:lnTo>
+                    <a:pt x="2806161" y="6235893"/>
+                  </a:lnTo>
+                  <a:cubicBezTo>
+                    <a:pt x="2806161" y="6580293"/>
+                    <a:pt x="3085369" y="6859501"/>
+                    <a:pt x="3429770" y="6859501"/>
+                  </a:cubicBezTo>
+                  <a:cubicBezTo>
+                    <a:pt x="3774171" y="6859501"/>
+                    <a:pt x="4053340" y="6580293"/>
+                    <a:pt x="4053340" y="6235893"/>
+                  </a:cubicBezTo>
+                  <a:close/>
+                </a:path>
+              </a:pathLst>
+            </a:custGeom>
+            <a:ln w="3848" cap="flat">
+              <a:noFill/>
+              <a:prstDash val="solid"/>
+              <a:miter/>
+            </a:ln>
+            <a:effectLst>
+              <a:glow rad="152400">
+                <a:srgbClr val="000000">
+                  <a:alpha val="4000"/>
+                </a:srgbClr>
+              </a:glow>
+              <a:outerShdw blurRad="101600" dist="38100" dir="16200000" rotWithShape="0">
+                <a:srgbClr val="000000">
+                  <a:alpha val="5000"/>
+                </a:srgbClr>
+              </a:outerShdw>
+            </a:effectLst>
+          </p:spPr>
+          <p:txBody>
+            <a:bodyPr rtlCol="0" anchor="ctr"/>
+            <a:lstStyle/>
+            <a:p>
+              <a:endParaRPr lang="en-US" dirty="0"/>
+            </a:p>
+          </p:txBody>
+        </p:sp>
+        <p:sp useBgFill="1">
+          <p:nvSpPr>
+            <p:cNvPr id="18" name="Oval 17">
+              <a:extLst>
+                <a:ext uri="{FF2B5EF4-FFF2-40B4-BE49-F238E27FC236}">
+                  <a16:creationId xmlns:a16="http://schemas.microsoft.com/office/drawing/2014/main" id="{23CA1A51-8DB4-445D-8FE3-498DB75CA588}"/>
+                </a:ext>
+                <a:ext uri="{C183D7F6-B498-43B3-948B-1728B52AA6E4}">
+                  <adec:decorative xmlns:adec="http://schemas.microsoft.com/office/drawing/2017/decorative" val="1"/>
+                </a:ext>
+              </a:extLst>
+            </p:cNvPr>
+            <p:cNvSpPr/>
+            <p:nvPr>
+              <p:extLst>
+                <p:ext uri="{386F3935-93C4-4BCD-93E2-E3B085C9AB24}">
+                  <p16:designElem xmlns:p16="http://schemas.microsoft.com/office/powerpoint/2015/main" val="1"/>
+                </p:ext>
+              </p:extLst>
+            </p:nvPr>
+          </p:nvSpPr>
+          <p:spPr>
+            <a:xfrm rot="10800000">
+              <a:off x="1815651" y="1342540"/>
+              <a:ext cx="215724" cy="215724"/>
+            </a:xfrm>
+            <a:prstGeom prst="ellipse">
+              <a:avLst/>
+            </a:prstGeom>
+            <a:ln w="3848" cap="flat">
+              <a:noFill/>
+              <a:prstDash val="solid"/>
+              <a:miter/>
+            </a:ln>
+            <a:effectLst>
+              <a:glow rad="152400">
+                <a:srgbClr val="000000">
+                  <a:alpha val="4000"/>
+                </a:srgbClr>
+              </a:glow>
+              <a:outerShdw blurRad="101600" dist="38100" dir="16200000" rotWithShape="0">
+                <a:srgbClr val="000000">
+                  <a:alpha val="5000"/>
+                </a:srgbClr>
+              </a:outerShdw>
+            </a:effectLst>
+          </p:spPr>
+          <p:txBody>
+            <a:bodyPr rtlCol="0" anchor="ctr"/>
+            <a:lstStyle/>
+            <a:p>
+              <a:endParaRPr lang="en-US" dirty="0"/>
+            </a:p>
+          </p:txBody>
+        </p:sp>
+        <p:sp useBgFill="1">
+          <p:nvSpPr>
+            <p:cNvPr id="19" name="Oval 18">
+              <a:extLst>
+                <a:ext uri="{FF2B5EF4-FFF2-40B4-BE49-F238E27FC236}">
+                  <a16:creationId xmlns:a16="http://schemas.microsoft.com/office/drawing/2014/main" id="{75DDD5AB-14AC-434C-95CC-18B81FAD36B9}"/>
+                </a:ext>
+                <a:ext uri="{C183D7F6-B498-43B3-948B-1728B52AA6E4}">
+                  <adec:decorative xmlns:adec="http://schemas.microsoft.com/office/drawing/2017/decorative" val="1"/>
+                </a:ext>
+              </a:extLst>
+            </p:cNvPr>
+            <p:cNvSpPr/>
+            <p:nvPr>
+              <p:extLst>
+                <p:ext uri="{386F3935-93C4-4BCD-93E2-E3B085C9AB24}">
+                  <p16:designElem xmlns:p16="http://schemas.microsoft.com/office/powerpoint/2015/main" val="1"/>
+                </p:ext>
+              </p:extLst>
+            </p:nvPr>
+          </p:nvSpPr>
+          <p:spPr>
+            <a:xfrm rot="10800000">
+              <a:off x="183404" y="225822"/>
+              <a:ext cx="474023" cy="474023"/>
+            </a:xfrm>
+            <a:prstGeom prst="ellipse">
+              <a:avLst/>
+            </a:prstGeom>
+            <a:ln w="3848" cap="flat">
+              <a:noFill/>
+              <a:prstDash val="solid"/>
+              <a:miter/>
+            </a:ln>
+            <a:effectLst>
+              <a:glow rad="152400">
+                <a:srgbClr val="000000">
+                  <a:alpha val="4000"/>
+                </a:srgbClr>
+              </a:glow>
+              <a:outerShdw blurRad="101600" dist="38100" dir="16200000" rotWithShape="0">
+                <a:srgbClr val="000000">
+                  <a:alpha val="5000"/>
+                </a:srgbClr>
+              </a:outerShdw>
+            </a:effectLst>
+          </p:spPr>
+          <p:txBody>
+            <a:bodyPr rtlCol="0" anchor="ctr"/>
+            <a:lstStyle/>
+            <a:p>
+              <a:endParaRPr lang="en-US"/>
+            </a:p>
+          </p:txBody>
+        </p:sp>
+        <p:sp useBgFill="1">
+          <p:nvSpPr>
+            <p:cNvPr id="20" name="Oval 19">
+              <a:extLst>
+                <a:ext uri="{FF2B5EF4-FFF2-40B4-BE49-F238E27FC236}">
+                  <a16:creationId xmlns:a16="http://schemas.microsoft.com/office/drawing/2014/main" id="{673FC915-211E-480B-8EC6-9659D9FCA15F}"/>
+                </a:ext>
+                <a:ext uri="{C183D7F6-B498-43B3-948B-1728B52AA6E4}">
+                  <adec:decorative xmlns:adec="http://schemas.microsoft.com/office/drawing/2017/decorative" val="1"/>
+                </a:ext>
+              </a:extLst>
+            </p:cNvPr>
+            <p:cNvSpPr/>
+            <p:nvPr>
+              <p:extLst>
+                <p:ext uri="{386F3935-93C4-4BCD-93E2-E3B085C9AB24}">
+                  <p16:designElem xmlns:p16="http://schemas.microsoft.com/office/powerpoint/2015/main" val="1"/>
+                </p:ext>
+              </p:extLst>
+            </p:nvPr>
+          </p:nvSpPr>
+          <p:spPr>
+            <a:xfrm rot="10800000">
+              <a:off x="583574" y="2333139"/>
+              <a:ext cx="330825" cy="330825"/>
+            </a:xfrm>
+            <a:prstGeom prst="ellipse">
+              <a:avLst/>
+            </a:prstGeom>
+            <a:ln w="3848" cap="flat">
+              <a:noFill/>
+              <a:prstDash val="solid"/>
+              <a:miter/>
+            </a:ln>
+            <a:effectLst>
+              <a:glow rad="152400">
+                <a:srgbClr val="000000">
+                  <a:alpha val="4000"/>
+                </a:srgbClr>
+              </a:glow>
+              <a:outerShdw blurRad="101600" dist="38100" dir="16200000" rotWithShape="0">
+                <a:srgbClr val="000000">
+                  <a:alpha val="5000"/>
+                </a:srgbClr>
+              </a:outerShdw>
+            </a:effectLst>
+          </p:spPr>
+          <p:txBody>
+            <a:bodyPr rtlCol="0" anchor="ctr"/>
+            <a:lstStyle/>
+            <a:p>
+              <a:endParaRPr lang="en-US" dirty="0"/>
+            </a:p>
+          </p:txBody>
+        </p:sp>
+      </p:grpSp>
+      <p:sp>
+        <p:nvSpPr>
+          <p:cNvPr id="22" name="Rectangle 21">
+            <a:extLst>
+              <a:ext uri="{FF2B5EF4-FFF2-40B4-BE49-F238E27FC236}">
+                <a16:creationId xmlns:a16="http://schemas.microsoft.com/office/drawing/2014/main" id="{EA80DA9C-57E0-4991-B11A-51E132563976}"/>
+              </a:ext>
+              <a:ext uri="{C183D7F6-B498-43B3-948B-1728B52AA6E4}">
+                <adec:decorative xmlns:adec="http://schemas.microsoft.com/office/drawing/2017/decorative" val="1"/>
+              </a:ext>
+            </a:extLst>
+          </p:cNvPr>
+          <p:cNvSpPr>
+            <a:spLocks noGrp="1" noRot="1" noChangeAspect="1" noMove="1" noResize="1" noEditPoints="1" noAdjustHandles="1" noChangeArrowheads="1" noChangeShapeType="1" noTextEdit="1"/>
+          </p:cNvSpPr>
+          <p:nvPr>
+            <p:extLst>
+              <p:ext uri="{386F3935-93C4-4BCD-93E2-E3B085C9AB24}">
+                <p16:designElem xmlns:p16="http://schemas.microsoft.com/office/powerpoint/2015/main" val="1"/>
+              </p:ext>
+            </p:extLst>
+          </p:nvPr>
+        </p:nvSpPr>
+        <p:spPr>
+          <a:xfrm>
+            <a:off x="0" y="0"/>
+            <a:ext cx="12192000" cy="6858000"/>
+          </a:xfrm>
+          <a:prstGeom prst="rect">
+            <a:avLst/>
+          </a:prstGeom>
+          <a:solidFill>
+            <a:schemeClr val="accent2">
+              <a:alpha val="40000"/>
+            </a:schemeClr>
+          </a:solidFill>
+          <a:ln w="3848" cap="flat">
+            <a:noFill/>
+            <a:prstDash val="solid"/>
+            <a:miter/>
+          </a:ln>
+          <a:effectLst/>
+        </p:spPr>
+        <p:txBody>
+          <a:bodyPr rtlCol="0" anchor="ctr"/>
+          <a:lstStyle/>
+          <a:p>
+            <a:endParaRPr lang="en-US" dirty="0">
+              <a:solidFill>
+                <a:schemeClr val="tx1"/>
+              </a:solidFill>
+            </a:endParaRPr>
+          </a:p>
+        </p:txBody>
+      </p:sp>
+      <p:sp>
+        <p:nvSpPr>
+          <p:cNvPr id="2" name="Titel 1">
+            <a:extLst>
+              <a:ext uri="{FF2B5EF4-FFF2-40B4-BE49-F238E27FC236}">
+                <a16:creationId xmlns:a16="http://schemas.microsoft.com/office/drawing/2014/main" id="{481E3781-A0D2-004D-EF09-2801F7ADB663}"/>
+              </a:ext>
+            </a:extLst>
+          </p:cNvPr>
+          <p:cNvSpPr>
+            <a:spLocks noGrp="1"/>
+          </p:cNvSpPr>
+          <p:nvPr>
+            <p:ph type="title"/>
+          </p:nvPr>
+        </p:nvSpPr>
+        <p:spPr>
+          <a:xfrm>
+            <a:off x="822352" y="566126"/>
+            <a:ext cx="10531448" cy="2210521"/>
+          </a:xfrm>
+        </p:spPr>
+        <p:txBody>
+          <a:bodyPr anchor="b">
+            <a:normAutofit/>
+          </a:bodyPr>
+          <a:lstStyle/>
+          <a:p>
+            <a:pPr algn="ctr"/>
+            <a:r>
+              <a:rPr lang="de-DE">
+                <a:solidFill>
+                  <a:srgbClr val="FFFFFF"/>
+                </a:solidFill>
+              </a:rPr>
+              <a:t>UML-Diagramm</a:t>
+            </a:r>
+          </a:p>
+        </p:txBody>
+      </p:sp>
+      <p:sp>
+        <p:nvSpPr>
+          <p:cNvPr id="9" name="Content Placeholder 8">
+            <a:extLst>
+              <a:ext uri="{FF2B5EF4-FFF2-40B4-BE49-F238E27FC236}">
+                <a16:creationId xmlns:a16="http://schemas.microsoft.com/office/drawing/2014/main" id="{0B95B4C8-C703-86B0-A1FE-ABA9770EE98A}"/>
+              </a:ext>
+            </a:extLst>
+          </p:cNvPr>
+          <p:cNvSpPr>
+            <a:spLocks noGrp="1"/>
+          </p:cNvSpPr>
+          <p:nvPr>
+            <p:ph idx="1"/>
+          </p:nvPr>
+        </p:nvSpPr>
+        <p:spPr>
+          <a:xfrm>
+            <a:off x="1992663" y="2948363"/>
+            <a:ext cx="8188032" cy="3176250"/>
+          </a:xfrm>
+        </p:spPr>
+        <p:txBody>
+          <a:bodyPr anchor="t">
+            <a:normAutofit/>
+          </a:bodyPr>
+          <a:lstStyle/>
+          <a:p>
+            <a:pPr algn="ctr"/>
+            <a:endParaRPr lang="en-US" sz="1800">
+              <a:solidFill>
+                <a:srgbClr val="FFFFFF"/>
+              </a:solidFill>
+            </a:endParaRPr>
+          </a:p>
+        </p:txBody>
+      </p:sp>
+    </p:spTree>
+    <p:extLst>
+      <p:ext uri="{BB962C8B-B14F-4D97-AF65-F5344CB8AC3E}">
+        <p14:creationId xmlns:p14="http://schemas.microsoft.com/office/powerpoint/2010/main" val="971749576"/>
       </p:ext>
     </p:extLst>
   </p:cSld>

</xml_diff>

<commit_message>
changes to app.py music
</commit_message>
<xml_diff>
--- a/flaskNumberGuesserGame Beining, Hennig.pptx
+++ b/flaskNumberGuesserGame Beining, Hennig.pptx
@@ -6505,8 +6505,8 @@
           </a:p>
         </p:txBody>
       </p:sp>
-      <mc:AlternateContent xmlns:mc="http://schemas.openxmlformats.org/markup-compatibility/2006">
-        <mc:Choice xmlns:a14="http://schemas.microsoft.com/office/drawing/2010/main" Requires="a14">
+      <mc:AlternateContent xmlns:mc="http://schemas.openxmlformats.org/markup-compatibility/2006" xmlns:a14="http://schemas.microsoft.com/office/drawing/2010/main">
+        <mc:Choice Requires="a14">
           <p:sp>
             <p:nvSpPr>
               <p:cNvPr id="8" name="Inhaltsplatzhalter 2">
@@ -6699,7 +6699,7 @@
             </p:txBody>
           </p:sp>
         </mc:Choice>
-        <mc:Fallback>
+        <mc:Fallback xmlns="">
           <p:sp>
             <p:nvSpPr>
               <p:cNvPr id="8" name="Inhaltsplatzhalter 2">
@@ -6743,8 +6743,8 @@
           </p:sp>
         </mc:Fallback>
       </mc:AlternateContent>
-      <mc:AlternateContent xmlns:mc="http://schemas.openxmlformats.org/markup-compatibility/2006">
-        <mc:Choice xmlns:a14="http://schemas.microsoft.com/office/drawing/2010/main" Requires="a14">
+      <mc:AlternateContent xmlns:mc="http://schemas.openxmlformats.org/markup-compatibility/2006" xmlns:a14="http://schemas.microsoft.com/office/drawing/2010/main">
+        <mc:Choice Requires="a14">
           <p:sp>
             <p:nvSpPr>
               <p:cNvPr id="14" name="Textfeld 13">
@@ -6935,7 +6935,7 @@
             </p:txBody>
           </p:sp>
         </mc:Choice>
-        <mc:Fallback>
+        <mc:Fallback xmlns="">
           <p:sp>
             <p:nvSpPr>
               <p:cNvPr id="14" name="Textfeld 13">

</xml_diff>